<commit_message>
Fix some bugs regarding computeInset().
- Add GraphUtil::normalizeLoop() to avoid the loop edge
</commit_message>
<xml_diff>
--- a/doc/results_20140411/results.pptx
+++ b/doc/results_20140411/results.pptx
@@ -5,29 +5,34 @@
     <p:sldMasterId id="2147483648" r:id="rId1"/>
   </p:sldMasterIdLst>
   <p:sldIdLst>
-    <p:sldId id="257" r:id="rId2"/>
-    <p:sldId id="258" r:id="rId3"/>
-    <p:sldId id="259" r:id="rId4"/>
-    <p:sldId id="260" r:id="rId5"/>
-    <p:sldId id="261" r:id="rId6"/>
-    <p:sldId id="262" r:id="rId7"/>
-    <p:sldId id="263" r:id="rId8"/>
-    <p:sldId id="264" r:id="rId9"/>
-    <p:sldId id="265" r:id="rId10"/>
-    <p:sldId id="266" r:id="rId11"/>
-    <p:sldId id="267" r:id="rId12"/>
-    <p:sldId id="268" r:id="rId13"/>
-    <p:sldId id="269" r:id="rId14"/>
-    <p:sldId id="270" r:id="rId15"/>
-    <p:sldId id="271" r:id="rId16"/>
-    <p:sldId id="272" r:id="rId17"/>
-    <p:sldId id="273" r:id="rId18"/>
-    <p:sldId id="274" r:id="rId19"/>
-    <p:sldId id="275" r:id="rId20"/>
-    <p:sldId id="276" r:id="rId21"/>
-    <p:sldId id="277" r:id="rId22"/>
-    <p:sldId id="278" r:id="rId23"/>
-    <p:sldId id="279" r:id="rId24"/>
+    <p:sldId id="280" r:id="rId2"/>
+    <p:sldId id="281" r:id="rId3"/>
+    <p:sldId id="282" r:id="rId4"/>
+    <p:sldId id="283" r:id="rId5"/>
+    <p:sldId id="284" r:id="rId6"/>
+    <p:sldId id="257" r:id="rId7"/>
+    <p:sldId id="258" r:id="rId8"/>
+    <p:sldId id="259" r:id="rId9"/>
+    <p:sldId id="260" r:id="rId10"/>
+    <p:sldId id="261" r:id="rId11"/>
+    <p:sldId id="262" r:id="rId12"/>
+    <p:sldId id="263" r:id="rId13"/>
+    <p:sldId id="264" r:id="rId14"/>
+    <p:sldId id="265" r:id="rId15"/>
+    <p:sldId id="266" r:id="rId16"/>
+    <p:sldId id="267" r:id="rId17"/>
+    <p:sldId id="268" r:id="rId18"/>
+    <p:sldId id="269" r:id="rId19"/>
+    <p:sldId id="270" r:id="rId20"/>
+    <p:sldId id="271" r:id="rId21"/>
+    <p:sldId id="272" r:id="rId22"/>
+    <p:sldId id="273" r:id="rId23"/>
+    <p:sldId id="274" r:id="rId24"/>
+    <p:sldId id="275" r:id="rId25"/>
+    <p:sldId id="276" r:id="rId26"/>
+    <p:sldId id="277" r:id="rId27"/>
+    <p:sldId id="278" r:id="rId28"/>
+    <p:sldId id="279" r:id="rId29"/>
   </p:sldIdLst>
   <p:sldSz cx="9144000" cy="6858000" type="screen4x3"/>
   <p:notesSz cx="6858000" cy="9144000"/>
@@ -3104,8 +3109,8 @@
         </p:blipFill>
         <p:spPr bwMode="auto">
           <a:xfrm>
-            <a:off x="477069" y="533400"/>
-            <a:ext cx="8057331" cy="5854286"/>
+            <a:off x="914400" y="609600"/>
+            <a:ext cx="7315200" cy="6015751"/>
           </a:xfrm>
           <a:prstGeom prst="rect">
             <a:avLst/>
@@ -3137,14 +3142,14 @@
       </p:pic>
       <p:sp>
         <p:nvSpPr>
-          <p:cNvPr id="2" name="TextBox 1"/>
+          <p:cNvPr id="3" name="TextBox 2"/>
           <p:cNvSpPr txBox="1"/>
           <p:nvPr/>
         </p:nvSpPr>
         <p:spPr>
           <a:xfrm>
             <a:off x="0" y="0"/>
-            <a:ext cx="4546694" cy="369332"/>
+            <a:ext cx="4399409" cy="369332"/>
           </a:xfrm>
           <a:prstGeom prst="rect">
             <a:avLst/>
@@ -3159,7 +3164,7 @@
           <a:p>
             <a:r>
               <a:rPr lang="en-US" dirty="0" smtClean="0"/>
-              <a:t>Multi examples (Tel-Aviv, Canberra, and Tokyo)</a:t>
+              <a:t>Single example, single initial seeds(Canberra)</a:t>
             </a:r>
             <a:endParaRPr lang="en-US" dirty="0"/>
           </a:p>
@@ -3168,7 +3173,7 @@
     </p:spTree>
     <p:extLst>
       <p:ext uri="{BB962C8B-B14F-4D97-AF65-F5344CB8AC3E}">
-        <p14:creationId xmlns:p14="http://schemas.microsoft.com/office/powerpoint/2010/main" val="1338740069"/>
+        <p14:creationId xmlns:p14="http://schemas.microsoft.com/office/powerpoint/2010/main" val="1580716083"/>
       </p:ext>
     </p:extLst>
   </p:cSld>
@@ -3197,7 +3202,7 @@
       </p:grpSpPr>
       <p:pic>
         <p:nvPicPr>
-          <p:cNvPr id="10242" name="Picture 2"/>
+          <p:cNvPr id="5122" name="Picture 2"/>
           <p:cNvPicPr>
             <a:picLocks noChangeAspect="1" noChangeArrowheads="1"/>
           </p:cNvPicPr>
@@ -3218,8 +3223,8 @@
         </p:blipFill>
         <p:spPr bwMode="auto">
           <a:xfrm>
-            <a:off x="4038600" y="2938337"/>
-            <a:ext cx="4800600" cy="3800726"/>
+            <a:off x="1999622" y="1371600"/>
+            <a:ext cx="5029200" cy="5121966"/>
           </a:xfrm>
           <a:prstGeom prst="rect">
             <a:avLst/>
@@ -3258,7 +3263,7 @@
         <p:spPr>
           <a:xfrm>
             <a:off x="0" y="0"/>
-            <a:ext cx="4854470" cy="369332"/>
+            <a:ext cx="3996607" cy="369332"/>
           </a:xfrm>
           <a:prstGeom prst="rect">
             <a:avLst/>
@@ -3273,15 +3278,7 @@
           <a:p>
             <a:r>
               <a:rPr lang="ja-JP" altLang="en-US" dirty="0" smtClean="0"/>
-              <a:t>バグ２．</a:t>
-            </a:r>
-            <a:r>
-              <a:rPr lang="en-US" altLang="ja-JP" dirty="0" smtClean="0"/>
-              <a:t>Local Streets</a:t>
-            </a:r>
-            <a:r>
-              <a:rPr lang="ja-JP" altLang="en-US" dirty="0" smtClean="0"/>
-              <a:t>が、全然生成されていない。</a:t>
+              <a:t>バグ４．赤色になるべき道路が、白色？</a:t>
             </a:r>
             <a:endParaRPr lang="en-US" dirty="0"/>
           </a:p>
@@ -3294,9 +3291,9 @@
           <p:nvPr/>
         </p:nvSpPr>
         <p:spPr>
-          <a:xfrm>
-            <a:off x="5780035" y="3928937"/>
-            <a:ext cx="2057400" cy="2057400"/>
+          <a:xfrm rot="19230883">
+            <a:off x="2872915" y="4504949"/>
+            <a:ext cx="3657600" cy="762000"/>
           </a:xfrm>
           <a:prstGeom prst="ellipse">
             <a:avLst/>
@@ -3334,70 +3331,16 @@
           </a:p>
         </p:txBody>
       </p:sp>
-      <p:pic>
-        <p:nvPicPr>
-          <p:cNvPr id="10243" name="Picture 3"/>
-          <p:cNvPicPr>
-            <a:picLocks noChangeAspect="1" noChangeArrowheads="1"/>
-          </p:cNvPicPr>
-          <p:nvPr/>
-        </p:nvPicPr>
-        <p:blipFill>
-          <a:blip r:embed="rId3">
-            <a:extLst>
-              <a:ext uri="{28A0092B-C50C-407E-A947-70E740481C1C}">
-                <a14:useLocalDpi xmlns:a14="http://schemas.microsoft.com/office/drawing/2010/main" val="0"/>
-              </a:ext>
-            </a:extLst>
-          </a:blip>
-          <a:srcRect/>
-          <a:stretch>
-            <a:fillRect/>
-          </a:stretch>
-        </p:blipFill>
-        <p:spPr bwMode="auto">
-          <a:xfrm>
-            <a:off x="152400" y="1066800"/>
-            <a:ext cx="3886200" cy="3682111"/>
-          </a:xfrm>
-          <a:prstGeom prst="rect">
-            <a:avLst/>
-          </a:prstGeom>
-          <a:noFill/>
-          <a:ln>
-            <a:noFill/>
-          </a:ln>
-          <a:extLst>
-            <a:ext uri="{909E8E84-426E-40DD-AFC4-6F175D3DCCD1}">
-              <a14:hiddenFill xmlns:a14="http://schemas.microsoft.com/office/drawing/2010/main">
-                <a:solidFill>
-                  <a:schemeClr val="accent1"/>
-                </a:solidFill>
-              </a14:hiddenFill>
-            </a:ext>
-            <a:ext uri="{91240B29-F687-4F45-9708-019B960494DF}">
-              <a14:hiddenLine xmlns:a14="http://schemas.microsoft.com/office/drawing/2010/main" w="9525">
-                <a:solidFill>
-                  <a:schemeClr val="tx1"/>
-                </a:solidFill>
-                <a:miter lim="800000"/>
-                <a:headEnd/>
-                <a:tailEnd/>
-              </a14:hiddenLine>
-            </a:ext>
-          </a:extLst>
-        </p:spPr>
-      </p:pic>
-      <p:sp>
-        <p:nvSpPr>
-          <p:cNvPr id="6" name="Oval 5"/>
+      <p:sp>
+        <p:nvSpPr>
+          <p:cNvPr id="5" name="Oval 4"/>
           <p:cNvSpPr/>
           <p:nvPr/>
         </p:nvSpPr>
         <p:spPr>
-          <a:xfrm>
-            <a:off x="1219200" y="2438400"/>
-            <a:ext cx="2057400" cy="2057400"/>
+          <a:xfrm rot="319563">
+            <a:off x="2573213" y="2775546"/>
+            <a:ext cx="838200" cy="3037114"/>
           </a:xfrm>
           <a:prstGeom prst="ellipse">
             <a:avLst/>
@@ -3438,7 +3381,7 @@
     </p:spTree>
     <p:extLst>
       <p:ext uri="{BB962C8B-B14F-4D97-AF65-F5344CB8AC3E}">
-        <p14:creationId xmlns:p14="http://schemas.microsoft.com/office/powerpoint/2010/main" val="2624708806"/>
+        <p14:creationId xmlns:p14="http://schemas.microsoft.com/office/powerpoint/2010/main" val="3530708907"/>
       </p:ext>
     </p:extLst>
   </p:cSld>
@@ -3467,14 +3410,14 @@
       </p:grpSpPr>
       <p:pic>
         <p:nvPicPr>
-          <p:cNvPr id="11266" name="Picture 2"/>
+          <p:cNvPr id="6146" name="Picture 2"/>
           <p:cNvPicPr>
             <a:picLocks noChangeAspect="1" noChangeArrowheads="1"/>
           </p:cNvPicPr>
           <p:nvPr/>
         </p:nvPicPr>
         <p:blipFill>
-          <a:blip r:embed="rId2" cstate="print">
+          <a:blip r:embed="rId2">
             <a:extLst>
               <a:ext uri="{28A0092B-C50C-407E-A947-70E740481C1C}">
                 <a14:useLocalDpi xmlns:a14="http://schemas.microsoft.com/office/drawing/2010/main" val="0"/>
@@ -3488,8 +3431,8 @@
         </p:blipFill>
         <p:spPr bwMode="auto">
           <a:xfrm>
-            <a:off x="4287494" y="3074995"/>
-            <a:ext cx="4273936" cy="3357294"/>
+            <a:off x="1143000" y="1060101"/>
+            <a:ext cx="6553200" cy="5566398"/>
           </a:xfrm>
           <a:prstGeom prst="rect">
             <a:avLst/>
@@ -3528,7 +3471,7 @@
         <p:spPr>
           <a:xfrm>
             <a:off x="0" y="0"/>
-            <a:ext cx="4600940" cy="369332"/>
+            <a:ext cx="7584512" cy="369332"/>
           </a:xfrm>
           <a:prstGeom prst="rect">
             <a:avLst/>
@@ -3543,164 +3486,32 @@
           <a:p>
             <a:r>
               <a:rPr lang="ja-JP" altLang="en-US" dirty="0" smtClean="0"/>
-              <a:t>バグ３．なぜか、赤色の道路が、こんな所に？</a:t>
+              <a:t>バグ５．</a:t>
+            </a:r>
+            <a:r>
+              <a:rPr lang="en-US" altLang="ja-JP" dirty="0" smtClean="0"/>
+              <a:t>PM</a:t>
+            </a:r>
+            <a:r>
+              <a:rPr lang="ja-JP" altLang="en-US" dirty="0" smtClean="0"/>
+              <a:t>生成の道路のど真ん中に、なぜか</a:t>
+            </a:r>
+            <a:r>
+              <a:rPr lang="en-US" altLang="ja-JP" dirty="0" smtClean="0"/>
+              <a:t>example</a:t>
+            </a:r>
+            <a:r>
+              <a:rPr lang="ja-JP" altLang="en-US" dirty="0" smtClean="0"/>
+              <a:t>ベースの道路がある？</a:t>
             </a:r>
             <a:endParaRPr lang="en-US" dirty="0"/>
-          </a:p>
-        </p:txBody>
-      </p:sp>
-      <p:sp>
-        <p:nvSpPr>
-          <p:cNvPr id="4" name="Oval 3"/>
-          <p:cNvSpPr/>
-          <p:nvPr/>
-        </p:nvSpPr>
-        <p:spPr>
-          <a:xfrm>
-            <a:off x="5776762" y="3497598"/>
-            <a:ext cx="1295400" cy="1295400"/>
-          </a:xfrm>
-          <a:prstGeom prst="ellipse">
-            <a:avLst/>
-          </a:prstGeom>
-          <a:noFill/>
-          <a:ln w="47625">
-            <a:solidFill>
-              <a:srgbClr val="FF0000"/>
-            </a:solidFill>
-            <a:prstDash val="dash"/>
-          </a:ln>
-        </p:spPr>
-        <p:style>
-          <a:lnRef idx="2">
-            <a:schemeClr val="accent1">
-              <a:shade val="50000"/>
-            </a:schemeClr>
-          </a:lnRef>
-          <a:fillRef idx="1">
-            <a:schemeClr val="accent1"/>
-          </a:fillRef>
-          <a:effectRef idx="0">
-            <a:schemeClr val="accent1"/>
-          </a:effectRef>
-          <a:fontRef idx="minor">
-            <a:schemeClr val="lt1"/>
-          </a:fontRef>
-        </p:style>
-        <p:txBody>
-          <a:bodyPr rtlCol="0" anchor="ctr"/>
-          <a:lstStyle/>
-          <a:p>
-            <a:pPr algn="ctr"/>
-            <a:endParaRPr lang="en-US"/>
-          </a:p>
-        </p:txBody>
-      </p:sp>
-      <p:pic>
-        <p:nvPicPr>
-          <p:cNvPr id="11267" name="Picture 3"/>
-          <p:cNvPicPr>
-            <a:picLocks noChangeAspect="1" noChangeArrowheads="1"/>
-          </p:cNvPicPr>
-          <p:nvPr/>
-        </p:nvPicPr>
-        <p:blipFill>
-          <a:blip r:embed="rId3" cstate="print">
-            <a:extLst>
-              <a:ext uri="{28A0092B-C50C-407E-A947-70E740481C1C}">
-                <a14:useLocalDpi xmlns:a14="http://schemas.microsoft.com/office/drawing/2010/main" val="0"/>
-              </a:ext>
-            </a:extLst>
-          </a:blip>
-          <a:srcRect/>
-          <a:stretch>
-            <a:fillRect/>
-          </a:stretch>
-        </p:blipFill>
-        <p:spPr bwMode="auto">
-          <a:xfrm>
-            <a:off x="257540" y="457200"/>
-            <a:ext cx="4343400" cy="2705663"/>
-          </a:xfrm>
-          <a:prstGeom prst="rect">
-            <a:avLst/>
-          </a:prstGeom>
-          <a:noFill/>
-          <a:ln>
-            <a:noFill/>
-          </a:ln>
-          <a:extLst>
-            <a:ext uri="{909E8E84-426E-40DD-AFC4-6F175D3DCCD1}">
-              <a14:hiddenFill xmlns:a14="http://schemas.microsoft.com/office/drawing/2010/main">
-                <a:solidFill>
-                  <a:schemeClr val="accent1"/>
-                </a:solidFill>
-              </a14:hiddenFill>
-            </a:ext>
-            <a:ext uri="{91240B29-F687-4F45-9708-019B960494DF}">
-              <a14:hiddenLine xmlns:a14="http://schemas.microsoft.com/office/drawing/2010/main" w="9525">
-                <a:solidFill>
-                  <a:schemeClr val="tx1"/>
-                </a:solidFill>
-                <a:miter lim="800000"/>
-                <a:headEnd/>
-                <a:tailEnd/>
-              </a14:hiddenLine>
-            </a:ext>
-          </a:extLst>
-        </p:spPr>
-      </p:pic>
-      <p:sp>
-        <p:nvSpPr>
-          <p:cNvPr id="6" name="Oval 5"/>
-          <p:cNvSpPr/>
-          <p:nvPr/>
-        </p:nvSpPr>
-        <p:spPr>
-          <a:xfrm>
-            <a:off x="1652770" y="685800"/>
-            <a:ext cx="1295400" cy="1295400"/>
-          </a:xfrm>
-          <a:prstGeom prst="ellipse">
-            <a:avLst/>
-          </a:prstGeom>
-          <a:noFill/>
-          <a:ln w="47625">
-            <a:solidFill>
-              <a:srgbClr val="FF0000"/>
-            </a:solidFill>
-            <a:prstDash val="dash"/>
-          </a:ln>
-        </p:spPr>
-        <p:style>
-          <a:lnRef idx="2">
-            <a:schemeClr val="accent1">
-              <a:shade val="50000"/>
-            </a:schemeClr>
-          </a:lnRef>
-          <a:fillRef idx="1">
-            <a:schemeClr val="accent1"/>
-          </a:fillRef>
-          <a:effectRef idx="0">
-            <a:schemeClr val="accent1"/>
-          </a:effectRef>
-          <a:fontRef idx="minor">
-            <a:schemeClr val="lt1"/>
-          </a:fontRef>
-        </p:style>
-        <p:txBody>
-          <a:bodyPr rtlCol="0" anchor="ctr"/>
-          <a:lstStyle/>
-          <a:p>
-            <a:pPr algn="ctr"/>
-            <a:endParaRPr lang="en-US"/>
           </a:p>
         </p:txBody>
       </p:sp>
     </p:spTree>
     <p:extLst>
       <p:ext uri="{BB962C8B-B14F-4D97-AF65-F5344CB8AC3E}">
-        <p14:creationId xmlns:p14="http://schemas.microsoft.com/office/powerpoint/2010/main" val="4180876165"/>
+        <p14:creationId xmlns:p14="http://schemas.microsoft.com/office/powerpoint/2010/main" val="3919586332"/>
       </p:ext>
     </p:extLst>
   </p:cSld>
@@ -3729,7 +3540,7 @@
       </p:grpSpPr>
       <p:pic>
         <p:nvPicPr>
-          <p:cNvPr id="12290" name="Picture 2"/>
+          <p:cNvPr id="7170" name="Picture 2"/>
           <p:cNvPicPr>
             <a:picLocks noChangeAspect="1" noChangeArrowheads="1"/>
           </p:cNvPicPr>
@@ -3750,8 +3561,8 @@
         </p:blipFill>
         <p:spPr bwMode="auto">
           <a:xfrm>
-            <a:off x="1524000" y="1295400"/>
-            <a:ext cx="6429375" cy="5305425"/>
+            <a:off x="1447800" y="1905000"/>
+            <a:ext cx="3148012" cy="4189008"/>
           </a:xfrm>
           <a:prstGeom prst="rect">
             <a:avLst/>
@@ -3790,7 +3601,7 @@
         <p:spPr>
           <a:xfrm>
             <a:off x="0" y="0"/>
-            <a:ext cx="3932487" cy="369332"/>
+            <a:ext cx="3252814" cy="369332"/>
           </a:xfrm>
           <a:prstGeom prst="rect">
             <a:avLst/>
@@ -3805,7 +3616,7 @@
           <a:p>
             <a:r>
               <a:rPr lang="ja-JP" altLang="en-US" dirty="0" smtClean="0"/>
-              <a:t>バグ４．なんか、道路が重なっている？</a:t>
+              <a:t>バグ６．エッジが交差している？</a:t>
             </a:r>
             <a:endParaRPr lang="en-US" dirty="0"/>
           </a:p>
@@ -3819,8 +3630,8 @@
         </p:nvSpPr>
         <p:spPr>
           <a:xfrm>
-            <a:off x="3810000" y="3468225"/>
-            <a:ext cx="1295400" cy="1295400"/>
+            <a:off x="2526506" y="3733800"/>
+            <a:ext cx="990600" cy="990600"/>
           </a:xfrm>
           <a:prstGeom prst="ellipse">
             <a:avLst/>
@@ -3861,7 +3672,7 @@
     </p:spTree>
     <p:extLst>
       <p:ext uri="{BB962C8B-B14F-4D97-AF65-F5344CB8AC3E}">
-        <p14:creationId xmlns:p14="http://schemas.microsoft.com/office/powerpoint/2010/main" val="3734118714"/>
+        <p14:creationId xmlns:p14="http://schemas.microsoft.com/office/powerpoint/2010/main" val="1996986813"/>
       </p:ext>
     </p:extLst>
   </p:cSld>
@@ -3890,7 +3701,7 @@
       </p:grpSpPr>
       <p:pic>
         <p:nvPicPr>
-          <p:cNvPr id="13315" name="Picture 3"/>
+          <p:cNvPr id="8194" name="Picture 2"/>
           <p:cNvPicPr>
             <a:picLocks noChangeAspect="1" noChangeArrowheads="1"/>
           </p:cNvPicPr>
@@ -3911,8 +3722,8 @@
         </p:blipFill>
         <p:spPr bwMode="auto">
           <a:xfrm>
-            <a:off x="1288700" y="838200"/>
-            <a:ext cx="6636100" cy="5509317"/>
+            <a:off x="1295400" y="609600"/>
+            <a:ext cx="6629400" cy="5968200"/>
           </a:xfrm>
           <a:prstGeom prst="rect">
             <a:avLst/>
@@ -3944,14 +3755,14 @@
       </p:pic>
       <p:sp>
         <p:nvSpPr>
-          <p:cNvPr id="4" name="TextBox 3"/>
+          <p:cNvPr id="3" name="TextBox 2"/>
           <p:cNvSpPr txBox="1"/>
           <p:nvPr/>
         </p:nvSpPr>
         <p:spPr>
           <a:xfrm>
             <a:off x="0" y="0"/>
-            <a:ext cx="4529317" cy="369332"/>
+            <a:ext cx="2578655" cy="369332"/>
           </a:xfrm>
           <a:prstGeom prst="rect">
             <a:avLst/>
@@ -3966,7 +3777,7 @@
           <a:p>
             <a:r>
               <a:rPr lang="en-US" dirty="0" smtClean="0"/>
-              <a:t>Interpolation (t = 0.85, 3 initial seeds, Tel-Aviv)</a:t>
+              <a:t>Adaptive Fitting (Tel-Aviv)</a:t>
             </a:r>
             <a:endParaRPr lang="en-US" dirty="0"/>
           </a:p>
@@ -3975,7 +3786,7 @@
     </p:spTree>
     <p:extLst>
       <p:ext uri="{BB962C8B-B14F-4D97-AF65-F5344CB8AC3E}">
-        <p14:creationId xmlns:p14="http://schemas.microsoft.com/office/powerpoint/2010/main" val="1391776747"/>
+        <p14:creationId xmlns:p14="http://schemas.microsoft.com/office/powerpoint/2010/main" val="949091332"/>
       </p:ext>
     </p:extLst>
   </p:cSld>
@@ -4004,7 +3815,7 @@
       </p:grpSpPr>
       <p:pic>
         <p:nvPicPr>
-          <p:cNvPr id="14338" name="Picture 2"/>
+          <p:cNvPr id="9218" name="Picture 2"/>
           <p:cNvPicPr>
             <a:picLocks noChangeAspect="1" noChangeArrowheads="1"/>
           </p:cNvPicPr>
@@ -4025,8 +3836,8 @@
         </p:blipFill>
         <p:spPr bwMode="auto">
           <a:xfrm>
-            <a:off x="1143000" y="1676400"/>
-            <a:ext cx="5457213" cy="3681412"/>
+            <a:off x="1347787" y="1447800"/>
+            <a:ext cx="6448425" cy="5000625"/>
           </a:xfrm>
           <a:prstGeom prst="rect">
             <a:avLst/>
@@ -4065,7 +3876,7 @@
         <p:spPr>
           <a:xfrm>
             <a:off x="0" y="0"/>
-            <a:ext cx="3751027" cy="369332"/>
+            <a:ext cx="5499904" cy="369332"/>
           </a:xfrm>
           <a:prstGeom prst="rect">
             <a:avLst/>
@@ -4088,15 +3899,15 @@
             </a:r>
             <a:r>
               <a:rPr lang="ja-JP" altLang="en-US" dirty="0" smtClean="0"/>
-              <a:t>．大量の</a:t>
+              <a:t>．円の中は、</a:t>
             </a:r>
             <a:r>
               <a:rPr lang="en-US" altLang="ja-JP" dirty="0" smtClean="0"/>
-              <a:t>dangling edge</a:t>
+              <a:t>Parcel</a:t>
             </a:r>
             <a:r>
               <a:rPr lang="ja-JP" altLang="en-US" dirty="0" smtClean="0"/>
-              <a:t>がある。</a:t>
+              <a:t>を生成しないようにしたい。。。</a:t>
             </a:r>
             <a:endParaRPr lang="en-US" dirty="0"/>
           </a:p>
@@ -4105,7 +3916,7 @@
     </p:spTree>
     <p:extLst>
       <p:ext uri="{BB962C8B-B14F-4D97-AF65-F5344CB8AC3E}">
-        <p14:creationId xmlns:p14="http://schemas.microsoft.com/office/powerpoint/2010/main" val="3076933511"/>
+        <p14:creationId xmlns:p14="http://schemas.microsoft.com/office/powerpoint/2010/main" val="4159386612"/>
       </p:ext>
     </p:extLst>
   </p:cSld>
@@ -4134,7 +3945,7 @@
       </p:grpSpPr>
       <p:pic>
         <p:nvPicPr>
-          <p:cNvPr id="15362" name="Picture 2"/>
+          <p:cNvPr id="10242" name="Picture 2"/>
           <p:cNvPicPr>
             <a:picLocks noChangeAspect="1" noChangeArrowheads="1"/>
           </p:cNvPicPr>
@@ -4155,8 +3966,8 @@
         </p:blipFill>
         <p:spPr bwMode="auto">
           <a:xfrm>
-            <a:off x="0" y="838200"/>
-            <a:ext cx="4887884" cy="3370142"/>
+            <a:off x="4038600" y="2938337"/>
+            <a:ext cx="4800600" cy="3800726"/>
           </a:xfrm>
           <a:prstGeom prst="rect">
             <a:avLst/>
@@ -4195,7 +4006,7 @@
         <p:spPr>
           <a:xfrm>
             <a:off x="0" y="0"/>
-            <a:ext cx="2627642" cy="369332"/>
+            <a:ext cx="4854470" cy="369332"/>
           </a:xfrm>
           <a:prstGeom prst="rect">
             <a:avLst/>
@@ -4210,76 +4021,30 @@
           <a:p>
             <a:r>
               <a:rPr lang="ja-JP" altLang="en-US" dirty="0" smtClean="0"/>
-              <a:t>バグ２．鋭角過ぎるエッジ</a:t>
+              <a:t>バグ２．</a:t>
+            </a:r>
+            <a:r>
+              <a:rPr lang="en-US" altLang="ja-JP" dirty="0" smtClean="0"/>
+              <a:t>Local Streets</a:t>
+            </a:r>
+            <a:r>
+              <a:rPr lang="ja-JP" altLang="en-US" dirty="0" smtClean="0"/>
+              <a:t>が、全然生成されていない。</a:t>
             </a:r>
             <a:endParaRPr lang="en-US" dirty="0"/>
           </a:p>
         </p:txBody>
       </p:sp>
-      <p:pic>
-        <p:nvPicPr>
-          <p:cNvPr id="15363" name="Picture 3"/>
-          <p:cNvPicPr>
-            <a:picLocks noChangeAspect="1" noChangeArrowheads="1"/>
-          </p:cNvPicPr>
-          <p:nvPr/>
-        </p:nvPicPr>
-        <p:blipFill>
-          <a:blip r:embed="rId3">
-            <a:extLst>
-              <a:ext uri="{28A0092B-C50C-407E-A947-70E740481C1C}">
-                <a14:useLocalDpi xmlns:a14="http://schemas.microsoft.com/office/drawing/2010/main" val="0"/>
-              </a:ext>
-            </a:extLst>
-          </a:blip>
-          <a:srcRect/>
-          <a:stretch>
-            <a:fillRect/>
-          </a:stretch>
-        </p:blipFill>
-        <p:spPr bwMode="auto">
-          <a:xfrm>
-            <a:off x="4191000" y="2873447"/>
-            <a:ext cx="4861386" cy="3908353"/>
-          </a:xfrm>
-          <a:prstGeom prst="rect">
-            <a:avLst/>
-          </a:prstGeom>
-          <a:noFill/>
-          <a:ln>
-            <a:noFill/>
-          </a:ln>
-          <a:extLst>
-            <a:ext uri="{909E8E84-426E-40DD-AFC4-6F175D3DCCD1}">
-              <a14:hiddenFill xmlns:a14="http://schemas.microsoft.com/office/drawing/2010/main">
-                <a:solidFill>
-                  <a:schemeClr val="accent1"/>
-                </a:solidFill>
-              </a14:hiddenFill>
-            </a:ext>
-            <a:ext uri="{91240B29-F687-4F45-9708-019B960494DF}">
-              <a14:hiddenLine xmlns:a14="http://schemas.microsoft.com/office/drawing/2010/main" w="9525">
-                <a:solidFill>
-                  <a:schemeClr val="tx1"/>
-                </a:solidFill>
-                <a:miter lim="800000"/>
-                <a:headEnd/>
-                <a:tailEnd/>
-              </a14:hiddenLine>
-            </a:ext>
-          </a:extLst>
-        </p:spPr>
-      </p:pic>
-      <p:sp>
-        <p:nvSpPr>
-          <p:cNvPr id="5" name="Oval 4"/>
+      <p:sp>
+        <p:nvSpPr>
+          <p:cNvPr id="4" name="Oval 3"/>
           <p:cNvSpPr/>
           <p:nvPr/>
         </p:nvSpPr>
         <p:spPr>
-          <a:xfrm rot="5400000">
-            <a:off x="6170263" y="3659537"/>
-            <a:ext cx="1295400" cy="1443927"/>
+          <a:xfrm>
+            <a:off x="5780035" y="3928937"/>
+            <a:ext cx="2057400" cy="2057400"/>
           </a:xfrm>
           <a:prstGeom prst="ellipse">
             <a:avLst/>
@@ -4287,7 +4052,7 @@
           <a:noFill/>
           <a:ln w="47625">
             <a:solidFill>
-              <a:srgbClr val="0000FF"/>
+              <a:srgbClr val="FF0000"/>
             </a:solidFill>
             <a:prstDash val="dash"/>
           </a:ln>
@@ -4317,6 +4082,60 @@
           </a:p>
         </p:txBody>
       </p:sp>
+      <p:pic>
+        <p:nvPicPr>
+          <p:cNvPr id="10243" name="Picture 3"/>
+          <p:cNvPicPr>
+            <a:picLocks noChangeAspect="1" noChangeArrowheads="1"/>
+          </p:cNvPicPr>
+          <p:nvPr/>
+        </p:nvPicPr>
+        <p:blipFill>
+          <a:blip r:embed="rId3">
+            <a:extLst>
+              <a:ext uri="{28A0092B-C50C-407E-A947-70E740481C1C}">
+                <a14:useLocalDpi xmlns:a14="http://schemas.microsoft.com/office/drawing/2010/main" val="0"/>
+              </a:ext>
+            </a:extLst>
+          </a:blip>
+          <a:srcRect/>
+          <a:stretch>
+            <a:fillRect/>
+          </a:stretch>
+        </p:blipFill>
+        <p:spPr bwMode="auto">
+          <a:xfrm>
+            <a:off x="152400" y="1066800"/>
+            <a:ext cx="3886200" cy="3682111"/>
+          </a:xfrm>
+          <a:prstGeom prst="rect">
+            <a:avLst/>
+          </a:prstGeom>
+          <a:noFill/>
+          <a:ln>
+            <a:noFill/>
+          </a:ln>
+          <a:extLst>
+            <a:ext uri="{909E8E84-426E-40DD-AFC4-6F175D3DCCD1}">
+              <a14:hiddenFill xmlns:a14="http://schemas.microsoft.com/office/drawing/2010/main">
+                <a:solidFill>
+                  <a:schemeClr val="accent1"/>
+                </a:solidFill>
+              </a14:hiddenFill>
+            </a:ext>
+            <a:ext uri="{91240B29-F687-4F45-9708-019B960494DF}">
+              <a14:hiddenLine xmlns:a14="http://schemas.microsoft.com/office/drawing/2010/main" w="9525">
+                <a:solidFill>
+                  <a:schemeClr val="tx1"/>
+                </a:solidFill>
+                <a:miter lim="800000"/>
+                <a:headEnd/>
+                <a:tailEnd/>
+              </a14:hiddenLine>
+            </a:ext>
+          </a:extLst>
+        </p:spPr>
+      </p:pic>
       <p:sp>
         <p:nvSpPr>
           <p:cNvPr id="6" name="Oval 5"/>
@@ -4324,9 +4143,9 @@
           <p:nvPr/>
         </p:nvSpPr>
         <p:spPr>
-          <a:xfrm rot="5400000">
-            <a:off x="1852185" y="2233187"/>
-            <a:ext cx="1858230" cy="1143000"/>
+          <a:xfrm>
+            <a:off x="1219200" y="2438400"/>
+            <a:ext cx="2057400" cy="2057400"/>
           </a:xfrm>
           <a:prstGeom prst="ellipse">
             <a:avLst/>
@@ -4334,7 +4153,7 @@
           <a:noFill/>
           <a:ln w="47625">
             <a:solidFill>
-              <a:srgbClr val="0000FF"/>
+              <a:srgbClr val="FF0000"/>
             </a:solidFill>
             <a:prstDash val="dash"/>
           </a:ln>
@@ -4364,212 +4183,10 @@
           </a:p>
         </p:txBody>
       </p:sp>
-      <p:pic>
-        <p:nvPicPr>
-          <p:cNvPr id="15364" name="Picture 4"/>
-          <p:cNvPicPr>
-            <a:picLocks noChangeAspect="1" noChangeArrowheads="1"/>
-          </p:cNvPicPr>
-          <p:nvPr/>
-        </p:nvPicPr>
-        <p:blipFill>
-          <a:blip r:embed="rId4">
-            <a:extLst>
-              <a:ext uri="{28A0092B-C50C-407E-A947-70E740481C1C}">
-                <a14:useLocalDpi xmlns:a14="http://schemas.microsoft.com/office/drawing/2010/main" val="0"/>
-              </a:ext>
-            </a:extLst>
-          </a:blip>
-          <a:srcRect/>
-          <a:stretch>
-            <a:fillRect/>
-          </a:stretch>
-        </p:blipFill>
-        <p:spPr bwMode="auto">
-          <a:xfrm>
-            <a:off x="6365002" y="253241"/>
-            <a:ext cx="2349850" cy="2551446"/>
-          </a:xfrm>
-          <a:prstGeom prst="rect">
-            <a:avLst/>
-          </a:prstGeom>
-          <a:noFill/>
-          <a:ln>
-            <a:noFill/>
-          </a:ln>
-          <a:extLst>
-            <a:ext uri="{909E8E84-426E-40DD-AFC4-6F175D3DCCD1}">
-              <a14:hiddenFill xmlns:a14="http://schemas.microsoft.com/office/drawing/2010/main">
-                <a:solidFill>
-                  <a:schemeClr val="accent1"/>
-                </a:solidFill>
-              </a14:hiddenFill>
-            </a:ext>
-            <a:ext uri="{91240B29-F687-4F45-9708-019B960494DF}">
-              <a14:hiddenLine xmlns:a14="http://schemas.microsoft.com/office/drawing/2010/main" w="9525">
-                <a:solidFill>
-                  <a:schemeClr val="tx1"/>
-                </a:solidFill>
-                <a:miter lim="800000"/>
-                <a:headEnd/>
-                <a:tailEnd/>
-              </a14:hiddenLine>
-            </a:ext>
-          </a:extLst>
-        </p:spPr>
-      </p:pic>
-      <p:sp>
-        <p:nvSpPr>
-          <p:cNvPr id="8" name="Oval 7"/>
-          <p:cNvSpPr/>
-          <p:nvPr/>
-        </p:nvSpPr>
-        <p:spPr>
-          <a:xfrm rot="5400000">
-            <a:off x="7044215" y="309192"/>
-            <a:ext cx="1049044" cy="1169325"/>
-          </a:xfrm>
-          <a:prstGeom prst="ellipse">
-            <a:avLst/>
-          </a:prstGeom>
-          <a:noFill/>
-          <a:ln w="47625">
-            <a:solidFill>
-              <a:srgbClr val="0000FF"/>
-            </a:solidFill>
-            <a:prstDash val="dash"/>
-          </a:ln>
-        </p:spPr>
-        <p:style>
-          <a:lnRef idx="2">
-            <a:schemeClr val="accent1">
-              <a:shade val="50000"/>
-            </a:schemeClr>
-          </a:lnRef>
-          <a:fillRef idx="1">
-            <a:schemeClr val="accent1"/>
-          </a:fillRef>
-          <a:effectRef idx="0">
-            <a:schemeClr val="accent1"/>
-          </a:effectRef>
-          <a:fontRef idx="minor">
-            <a:schemeClr val="lt1"/>
-          </a:fontRef>
-        </p:style>
-        <p:txBody>
-          <a:bodyPr rtlCol="0" anchor="ctr"/>
-          <a:lstStyle/>
-          <a:p>
-            <a:pPr algn="ctr"/>
-            <a:endParaRPr lang="en-US"/>
-          </a:p>
-        </p:txBody>
-      </p:sp>
-      <p:pic>
-        <p:nvPicPr>
-          <p:cNvPr id="15365" name="Picture 5"/>
-          <p:cNvPicPr>
-            <a:picLocks noChangeAspect="1" noChangeArrowheads="1"/>
-          </p:cNvPicPr>
-          <p:nvPr/>
-        </p:nvPicPr>
-        <p:blipFill>
-          <a:blip r:embed="rId5" cstate="print">
-            <a:extLst>
-              <a:ext uri="{28A0092B-C50C-407E-A947-70E740481C1C}">
-                <a14:useLocalDpi xmlns:a14="http://schemas.microsoft.com/office/drawing/2010/main" val="0"/>
-              </a:ext>
-            </a:extLst>
-          </a:blip>
-          <a:srcRect/>
-          <a:stretch>
-            <a:fillRect/>
-          </a:stretch>
-        </p:blipFill>
-        <p:spPr bwMode="auto">
-          <a:xfrm>
-            <a:off x="533400" y="4827623"/>
-            <a:ext cx="3011362" cy="1557337"/>
-          </a:xfrm>
-          <a:prstGeom prst="rect">
-            <a:avLst/>
-          </a:prstGeom>
-          <a:noFill/>
-          <a:ln>
-            <a:noFill/>
-          </a:ln>
-          <a:extLst>
-            <a:ext uri="{909E8E84-426E-40DD-AFC4-6F175D3DCCD1}">
-              <a14:hiddenFill xmlns:a14="http://schemas.microsoft.com/office/drawing/2010/main">
-                <a:solidFill>
-                  <a:schemeClr val="accent1"/>
-                </a:solidFill>
-              </a14:hiddenFill>
-            </a:ext>
-            <a:ext uri="{91240B29-F687-4F45-9708-019B960494DF}">
-              <a14:hiddenLine xmlns:a14="http://schemas.microsoft.com/office/drawing/2010/main" w="9525">
-                <a:solidFill>
-                  <a:schemeClr val="tx1"/>
-                </a:solidFill>
-                <a:miter lim="800000"/>
-                <a:headEnd/>
-                <a:tailEnd/>
-              </a14:hiddenLine>
-            </a:ext>
-          </a:extLst>
-        </p:spPr>
-      </p:pic>
-      <p:sp>
-        <p:nvSpPr>
-          <p:cNvPr id="10" name="Oval 9"/>
-          <p:cNvSpPr/>
-          <p:nvPr/>
-        </p:nvSpPr>
-        <p:spPr>
-          <a:xfrm rot="5400000">
-            <a:off x="1402431" y="4816660"/>
-            <a:ext cx="1049044" cy="1169325"/>
-          </a:xfrm>
-          <a:prstGeom prst="ellipse">
-            <a:avLst/>
-          </a:prstGeom>
-          <a:noFill/>
-          <a:ln w="47625">
-            <a:solidFill>
-              <a:srgbClr val="0000FF"/>
-            </a:solidFill>
-            <a:prstDash val="dash"/>
-          </a:ln>
-        </p:spPr>
-        <p:style>
-          <a:lnRef idx="2">
-            <a:schemeClr val="accent1">
-              <a:shade val="50000"/>
-            </a:schemeClr>
-          </a:lnRef>
-          <a:fillRef idx="1">
-            <a:schemeClr val="accent1"/>
-          </a:fillRef>
-          <a:effectRef idx="0">
-            <a:schemeClr val="accent1"/>
-          </a:effectRef>
-          <a:fontRef idx="minor">
-            <a:schemeClr val="lt1"/>
-          </a:fontRef>
-        </p:style>
-        <p:txBody>
-          <a:bodyPr rtlCol="0" anchor="ctr"/>
-          <a:lstStyle/>
-          <a:p>
-            <a:pPr algn="ctr"/>
-            <a:endParaRPr lang="en-US"/>
-          </a:p>
-        </p:txBody>
-      </p:sp>
     </p:spTree>
     <p:extLst>
       <p:ext uri="{BB962C8B-B14F-4D97-AF65-F5344CB8AC3E}">
-        <p14:creationId xmlns:p14="http://schemas.microsoft.com/office/powerpoint/2010/main" val="142476919"/>
+        <p14:creationId xmlns:p14="http://schemas.microsoft.com/office/powerpoint/2010/main" val="2624708806"/>
       </p:ext>
     </p:extLst>
   </p:cSld>
@@ -4598,14 +4215,14 @@
       </p:grpSpPr>
       <p:pic>
         <p:nvPicPr>
-          <p:cNvPr id="16386" name="Picture 2"/>
+          <p:cNvPr id="11266" name="Picture 2"/>
           <p:cNvPicPr>
             <a:picLocks noChangeAspect="1" noChangeArrowheads="1"/>
           </p:cNvPicPr>
           <p:nvPr/>
         </p:nvPicPr>
         <p:blipFill>
-          <a:blip r:embed="rId2">
+          <a:blip r:embed="rId2" cstate="print">
             <a:extLst>
               <a:ext uri="{28A0092B-C50C-407E-A947-70E740481C1C}">
                 <a14:useLocalDpi xmlns:a14="http://schemas.microsoft.com/office/drawing/2010/main" val="0"/>
@@ -4619,8 +4236,8 @@
         </p:blipFill>
         <p:spPr bwMode="auto">
           <a:xfrm>
-            <a:off x="1828800" y="1600200"/>
-            <a:ext cx="4978429" cy="4852988"/>
+            <a:off x="4287494" y="3074995"/>
+            <a:ext cx="4273936" cy="3357294"/>
           </a:xfrm>
           <a:prstGeom prst="rect">
             <a:avLst/>
@@ -4659,7 +4276,7 @@
         <p:spPr>
           <a:xfrm>
             <a:off x="0" y="0"/>
-            <a:ext cx="4564070" cy="369332"/>
+            <a:ext cx="4600940" cy="369332"/>
           </a:xfrm>
           <a:prstGeom prst="rect">
             <a:avLst/>
@@ -4674,16 +4291,164 @@
           <a:p>
             <a:r>
               <a:rPr lang="ja-JP" altLang="en-US" dirty="0" smtClean="0"/>
-              <a:t>バグ３．円なのに、なんで赤色になってない？</a:t>
+              <a:t>バグ３．なぜか、赤色の道路が、こんな所に？</a:t>
             </a:r>
             <a:endParaRPr lang="en-US" dirty="0"/>
+          </a:p>
+        </p:txBody>
+      </p:sp>
+      <p:sp>
+        <p:nvSpPr>
+          <p:cNvPr id="4" name="Oval 3"/>
+          <p:cNvSpPr/>
+          <p:nvPr/>
+        </p:nvSpPr>
+        <p:spPr>
+          <a:xfrm>
+            <a:off x="5776762" y="3497598"/>
+            <a:ext cx="1295400" cy="1295400"/>
+          </a:xfrm>
+          <a:prstGeom prst="ellipse">
+            <a:avLst/>
+          </a:prstGeom>
+          <a:noFill/>
+          <a:ln w="47625">
+            <a:solidFill>
+              <a:srgbClr val="FF0000"/>
+            </a:solidFill>
+            <a:prstDash val="dash"/>
+          </a:ln>
+        </p:spPr>
+        <p:style>
+          <a:lnRef idx="2">
+            <a:schemeClr val="accent1">
+              <a:shade val="50000"/>
+            </a:schemeClr>
+          </a:lnRef>
+          <a:fillRef idx="1">
+            <a:schemeClr val="accent1"/>
+          </a:fillRef>
+          <a:effectRef idx="0">
+            <a:schemeClr val="accent1"/>
+          </a:effectRef>
+          <a:fontRef idx="minor">
+            <a:schemeClr val="lt1"/>
+          </a:fontRef>
+        </p:style>
+        <p:txBody>
+          <a:bodyPr rtlCol="0" anchor="ctr"/>
+          <a:lstStyle/>
+          <a:p>
+            <a:pPr algn="ctr"/>
+            <a:endParaRPr lang="en-US"/>
+          </a:p>
+        </p:txBody>
+      </p:sp>
+      <p:pic>
+        <p:nvPicPr>
+          <p:cNvPr id="11267" name="Picture 3"/>
+          <p:cNvPicPr>
+            <a:picLocks noChangeAspect="1" noChangeArrowheads="1"/>
+          </p:cNvPicPr>
+          <p:nvPr/>
+        </p:nvPicPr>
+        <p:blipFill>
+          <a:blip r:embed="rId3" cstate="print">
+            <a:extLst>
+              <a:ext uri="{28A0092B-C50C-407E-A947-70E740481C1C}">
+                <a14:useLocalDpi xmlns:a14="http://schemas.microsoft.com/office/drawing/2010/main" val="0"/>
+              </a:ext>
+            </a:extLst>
+          </a:blip>
+          <a:srcRect/>
+          <a:stretch>
+            <a:fillRect/>
+          </a:stretch>
+        </p:blipFill>
+        <p:spPr bwMode="auto">
+          <a:xfrm>
+            <a:off x="257540" y="457200"/>
+            <a:ext cx="4343400" cy="2705663"/>
+          </a:xfrm>
+          <a:prstGeom prst="rect">
+            <a:avLst/>
+          </a:prstGeom>
+          <a:noFill/>
+          <a:ln>
+            <a:noFill/>
+          </a:ln>
+          <a:extLst>
+            <a:ext uri="{909E8E84-426E-40DD-AFC4-6F175D3DCCD1}">
+              <a14:hiddenFill xmlns:a14="http://schemas.microsoft.com/office/drawing/2010/main">
+                <a:solidFill>
+                  <a:schemeClr val="accent1"/>
+                </a:solidFill>
+              </a14:hiddenFill>
+            </a:ext>
+            <a:ext uri="{91240B29-F687-4F45-9708-019B960494DF}">
+              <a14:hiddenLine xmlns:a14="http://schemas.microsoft.com/office/drawing/2010/main" w="9525">
+                <a:solidFill>
+                  <a:schemeClr val="tx1"/>
+                </a:solidFill>
+                <a:miter lim="800000"/>
+                <a:headEnd/>
+                <a:tailEnd/>
+              </a14:hiddenLine>
+            </a:ext>
+          </a:extLst>
+        </p:spPr>
+      </p:pic>
+      <p:sp>
+        <p:nvSpPr>
+          <p:cNvPr id="6" name="Oval 5"/>
+          <p:cNvSpPr/>
+          <p:nvPr/>
+        </p:nvSpPr>
+        <p:spPr>
+          <a:xfrm>
+            <a:off x="1652770" y="685800"/>
+            <a:ext cx="1295400" cy="1295400"/>
+          </a:xfrm>
+          <a:prstGeom prst="ellipse">
+            <a:avLst/>
+          </a:prstGeom>
+          <a:noFill/>
+          <a:ln w="47625">
+            <a:solidFill>
+              <a:srgbClr val="FF0000"/>
+            </a:solidFill>
+            <a:prstDash val="dash"/>
+          </a:ln>
+        </p:spPr>
+        <p:style>
+          <a:lnRef idx="2">
+            <a:schemeClr val="accent1">
+              <a:shade val="50000"/>
+            </a:schemeClr>
+          </a:lnRef>
+          <a:fillRef idx="1">
+            <a:schemeClr val="accent1"/>
+          </a:fillRef>
+          <a:effectRef idx="0">
+            <a:schemeClr val="accent1"/>
+          </a:effectRef>
+          <a:fontRef idx="minor">
+            <a:schemeClr val="lt1"/>
+          </a:fontRef>
+        </p:style>
+        <p:txBody>
+          <a:bodyPr rtlCol="0" anchor="ctr"/>
+          <a:lstStyle/>
+          <a:p>
+            <a:pPr algn="ctr"/>
+            <a:endParaRPr lang="en-US"/>
           </a:p>
         </p:txBody>
       </p:sp>
     </p:spTree>
     <p:extLst>
       <p:ext uri="{BB962C8B-B14F-4D97-AF65-F5344CB8AC3E}">
-        <p14:creationId xmlns:p14="http://schemas.microsoft.com/office/powerpoint/2010/main" val="3852474453"/>
+        <p14:creationId xmlns:p14="http://schemas.microsoft.com/office/powerpoint/2010/main" val="4180876165"/>
       </p:ext>
     </p:extLst>
   </p:cSld>
@@ -4712,7 +4477,7 @@
       </p:grpSpPr>
       <p:pic>
         <p:nvPicPr>
-          <p:cNvPr id="17410" name="Picture 2"/>
+          <p:cNvPr id="12290" name="Picture 2"/>
           <p:cNvPicPr>
             <a:picLocks noChangeAspect="1" noChangeArrowheads="1"/>
           </p:cNvPicPr>
@@ -4733,8 +4498,8 @@
         </p:blipFill>
         <p:spPr bwMode="auto">
           <a:xfrm>
-            <a:off x="301921" y="914400"/>
-            <a:ext cx="4574879" cy="3383333"/>
+            <a:off x="1524000" y="1295400"/>
+            <a:ext cx="6429375" cy="5305425"/>
           </a:xfrm>
           <a:prstGeom prst="rect">
             <a:avLst/>
@@ -4773,7 +4538,7 @@
         <p:spPr>
           <a:xfrm>
             <a:off x="0" y="0"/>
-            <a:ext cx="3018775" cy="369332"/>
+            <a:ext cx="3932487" cy="369332"/>
           </a:xfrm>
           <a:prstGeom prst="rect">
             <a:avLst/>
@@ -4788,76 +4553,22 @@
           <a:p>
             <a:r>
               <a:rPr lang="ja-JP" altLang="en-US" dirty="0" smtClean="0"/>
-              <a:t>バグ４．交差しちゃっている？</a:t>
+              <a:t>バグ４．なんか、道路が重なっている？</a:t>
             </a:r>
             <a:endParaRPr lang="en-US" dirty="0"/>
           </a:p>
         </p:txBody>
       </p:sp>
-      <p:pic>
-        <p:nvPicPr>
-          <p:cNvPr id="17411" name="Picture 3"/>
-          <p:cNvPicPr>
-            <a:picLocks noChangeAspect="1" noChangeArrowheads="1"/>
-          </p:cNvPicPr>
-          <p:nvPr/>
-        </p:nvPicPr>
-        <p:blipFill>
-          <a:blip r:embed="rId3">
-            <a:extLst>
-              <a:ext uri="{28A0092B-C50C-407E-A947-70E740481C1C}">
-                <a14:useLocalDpi xmlns:a14="http://schemas.microsoft.com/office/drawing/2010/main" val="0"/>
-              </a:ext>
-            </a:extLst>
-          </a:blip>
-          <a:srcRect/>
-          <a:stretch>
-            <a:fillRect/>
-          </a:stretch>
-        </p:blipFill>
-        <p:spPr bwMode="auto">
-          <a:xfrm>
-            <a:off x="4419600" y="4014510"/>
-            <a:ext cx="4267200" cy="2677044"/>
-          </a:xfrm>
-          <a:prstGeom prst="rect">
-            <a:avLst/>
-          </a:prstGeom>
-          <a:noFill/>
-          <a:ln>
-            <a:noFill/>
-          </a:ln>
-          <a:extLst>
-            <a:ext uri="{909E8E84-426E-40DD-AFC4-6F175D3DCCD1}">
-              <a14:hiddenFill xmlns:a14="http://schemas.microsoft.com/office/drawing/2010/main">
-                <a:solidFill>
-                  <a:schemeClr val="accent1"/>
-                </a:solidFill>
-              </a14:hiddenFill>
-            </a:ext>
-            <a:ext uri="{91240B29-F687-4F45-9708-019B960494DF}">
-              <a14:hiddenLine xmlns:a14="http://schemas.microsoft.com/office/drawing/2010/main" w="9525">
-                <a:solidFill>
-                  <a:schemeClr val="tx1"/>
-                </a:solidFill>
-                <a:miter lim="800000"/>
-                <a:headEnd/>
-                <a:tailEnd/>
-              </a14:hiddenLine>
-            </a:ext>
-          </a:extLst>
-        </p:spPr>
-      </p:pic>
-      <p:sp>
-        <p:nvSpPr>
-          <p:cNvPr id="6" name="Oval 5"/>
+      <p:sp>
+        <p:nvSpPr>
+          <p:cNvPr id="4" name="Oval 3"/>
           <p:cNvSpPr/>
           <p:nvPr/>
         </p:nvSpPr>
         <p:spPr>
-          <a:xfrm rot="5400000">
-            <a:off x="1966486" y="1767314"/>
-            <a:ext cx="1705828" cy="914400"/>
+          <a:xfrm>
+            <a:off x="3810000" y="3468225"/>
+            <a:ext cx="1295400" cy="1295400"/>
           </a:xfrm>
           <a:prstGeom prst="ellipse">
             <a:avLst/>
@@ -4865,7 +4576,7 @@
           <a:noFill/>
           <a:ln w="47625">
             <a:solidFill>
-              <a:srgbClr val="0000FF"/>
+              <a:srgbClr val="FF0000"/>
             </a:solidFill>
             <a:prstDash val="dash"/>
           </a:ln>
@@ -4895,57 +4606,10 @@
           </a:p>
         </p:txBody>
       </p:sp>
-      <p:sp>
-        <p:nvSpPr>
-          <p:cNvPr id="7" name="Oval 6"/>
-          <p:cNvSpPr/>
-          <p:nvPr/>
-        </p:nvSpPr>
-        <p:spPr>
-          <a:xfrm rot="934534">
-            <a:off x="5547886" y="4815314"/>
-            <a:ext cx="1705828" cy="914400"/>
-          </a:xfrm>
-          <a:prstGeom prst="ellipse">
-            <a:avLst/>
-          </a:prstGeom>
-          <a:noFill/>
-          <a:ln w="47625">
-            <a:solidFill>
-              <a:srgbClr val="0000FF"/>
-            </a:solidFill>
-            <a:prstDash val="dash"/>
-          </a:ln>
-        </p:spPr>
-        <p:style>
-          <a:lnRef idx="2">
-            <a:schemeClr val="accent1">
-              <a:shade val="50000"/>
-            </a:schemeClr>
-          </a:lnRef>
-          <a:fillRef idx="1">
-            <a:schemeClr val="accent1"/>
-          </a:fillRef>
-          <a:effectRef idx="0">
-            <a:schemeClr val="accent1"/>
-          </a:effectRef>
-          <a:fontRef idx="minor">
-            <a:schemeClr val="lt1"/>
-          </a:fontRef>
-        </p:style>
-        <p:txBody>
-          <a:bodyPr rtlCol="0" anchor="ctr"/>
-          <a:lstStyle/>
-          <a:p>
-            <a:pPr algn="ctr"/>
-            <a:endParaRPr lang="en-US"/>
-          </a:p>
-        </p:txBody>
-      </p:sp>
     </p:spTree>
     <p:extLst>
       <p:ext uri="{BB962C8B-B14F-4D97-AF65-F5344CB8AC3E}">
-        <p14:creationId xmlns:p14="http://schemas.microsoft.com/office/powerpoint/2010/main" val="2615965870"/>
+        <p14:creationId xmlns:p14="http://schemas.microsoft.com/office/powerpoint/2010/main" val="3734118714"/>
       </p:ext>
     </p:extLst>
   </p:cSld>
@@ -4974,7 +4638,7 @@
       </p:grpSpPr>
       <p:pic>
         <p:nvPicPr>
-          <p:cNvPr id="18434" name="Picture 2"/>
+          <p:cNvPr id="13315" name="Picture 3"/>
           <p:cNvPicPr>
             <a:picLocks noChangeAspect="1" noChangeArrowheads="1"/>
           </p:cNvPicPr>
@@ -4995,8 +4659,8 @@
         </p:blipFill>
         <p:spPr bwMode="auto">
           <a:xfrm>
-            <a:off x="1295400" y="1447800"/>
-            <a:ext cx="6196012" cy="4736537"/>
+            <a:off x="1288700" y="838200"/>
+            <a:ext cx="6636100" cy="5509317"/>
           </a:xfrm>
           <a:prstGeom prst="rect">
             <a:avLst/>
@@ -5028,14 +4692,14 @@
       </p:pic>
       <p:sp>
         <p:nvSpPr>
-          <p:cNvPr id="3" name="TextBox 2"/>
+          <p:cNvPr id="4" name="TextBox 3"/>
           <p:cNvSpPr txBox="1"/>
           <p:nvPr/>
         </p:nvSpPr>
         <p:spPr>
           <a:xfrm>
             <a:off x="0" y="0"/>
-            <a:ext cx="6084999" cy="369332"/>
+            <a:ext cx="4529317" cy="369332"/>
           </a:xfrm>
           <a:prstGeom prst="rect">
             <a:avLst/>
@@ -5049,24 +4713,8 @@
           <a:lstStyle/>
           <a:p>
             <a:r>
-              <a:rPr lang="ja-JP" altLang="en-US" dirty="0" smtClean="0"/>
-              <a:t>バグ５．</a:t>
-            </a:r>
-            <a:r>
-              <a:rPr lang="en-US" altLang="ja-JP" dirty="0" smtClean="0"/>
-              <a:t>Block</a:t>
-            </a:r>
-            <a:r>
-              <a:rPr lang="ja-JP" altLang="en-US" dirty="0" smtClean="0"/>
-              <a:t>は作成されいているのに、</a:t>
-            </a:r>
-            <a:r>
-              <a:rPr lang="en-US" altLang="ja-JP" dirty="0" smtClean="0"/>
-              <a:t>Parcel</a:t>
-            </a:r>
-            <a:r>
-              <a:rPr lang="ja-JP" altLang="en-US" dirty="0" smtClean="0"/>
-              <a:t>が作成されない</a:t>
+              <a:rPr lang="en-US" dirty="0" smtClean="0"/>
+              <a:t>Interpolation (t = 0.85, 3 initial seeds, Tel-Aviv)</a:t>
             </a:r>
             <a:endParaRPr lang="en-US" dirty="0"/>
           </a:p>
@@ -5075,7 +4723,7 @@
     </p:spTree>
     <p:extLst>
       <p:ext uri="{BB962C8B-B14F-4D97-AF65-F5344CB8AC3E}">
-        <p14:creationId xmlns:p14="http://schemas.microsoft.com/office/powerpoint/2010/main" val="732611421"/>
+        <p14:creationId xmlns:p14="http://schemas.microsoft.com/office/powerpoint/2010/main" val="1391776747"/>
       </p:ext>
     </p:extLst>
   </p:cSld>
@@ -5104,7 +4752,7 @@
       </p:grpSpPr>
       <p:pic>
         <p:nvPicPr>
-          <p:cNvPr id="19458" name="Picture 2"/>
+          <p:cNvPr id="14338" name="Picture 2"/>
           <p:cNvPicPr>
             <a:picLocks noChangeAspect="1" noChangeArrowheads="1"/>
           </p:cNvPicPr>
@@ -5125,8 +4773,8 @@
         </p:blipFill>
         <p:spPr bwMode="auto">
           <a:xfrm>
-            <a:off x="4724400" y="3124200"/>
-            <a:ext cx="4143375" cy="3343275"/>
+            <a:off x="1143000" y="1676400"/>
+            <a:ext cx="5457213" cy="3681412"/>
           </a:xfrm>
           <a:prstGeom prst="rect">
             <a:avLst/>
@@ -5165,7 +4813,7 @@
         <p:spPr>
           <a:xfrm>
             <a:off x="0" y="0"/>
-            <a:ext cx="3913251" cy="369332"/>
+            <a:ext cx="3751027" cy="369332"/>
           </a:xfrm>
           <a:prstGeom prst="rect">
             <a:avLst/>
@@ -5184,74 +4832,28 @@
             </a:r>
             <a:r>
               <a:rPr lang="ja-JP" altLang="en-US" dirty="0"/>
-              <a:t>６</a:t>
+              <a:t>１</a:t>
             </a:r>
             <a:r>
               <a:rPr lang="ja-JP" altLang="en-US" dirty="0" smtClean="0"/>
-              <a:t>．頂点が他のエッジに近すぎる。</a:t>
+              <a:t>．大量の</a:t>
+            </a:r>
+            <a:r>
+              <a:rPr lang="en-US" altLang="ja-JP" dirty="0" smtClean="0"/>
+              <a:t>dangling edge</a:t>
+            </a:r>
+            <a:r>
+              <a:rPr lang="ja-JP" altLang="en-US" dirty="0" smtClean="0"/>
+              <a:t>がある。</a:t>
             </a:r>
             <a:endParaRPr lang="en-US" dirty="0"/>
           </a:p>
         </p:txBody>
       </p:sp>
-      <p:pic>
-        <p:nvPicPr>
-          <p:cNvPr id="19459" name="Picture 3"/>
-          <p:cNvPicPr>
-            <a:picLocks noChangeAspect="1" noChangeArrowheads="1"/>
-          </p:cNvPicPr>
-          <p:nvPr/>
-        </p:nvPicPr>
-        <p:blipFill>
-          <a:blip r:embed="rId3">
-            <a:extLst>
-              <a:ext uri="{28A0092B-C50C-407E-A947-70E740481C1C}">
-                <a14:useLocalDpi xmlns:a14="http://schemas.microsoft.com/office/drawing/2010/main" val="0"/>
-              </a:ext>
-            </a:extLst>
-          </a:blip>
-          <a:srcRect/>
-          <a:stretch>
-            <a:fillRect/>
-          </a:stretch>
-        </p:blipFill>
-        <p:spPr bwMode="auto">
-          <a:xfrm>
-            <a:off x="381000" y="1066800"/>
-            <a:ext cx="3753684" cy="2438400"/>
-          </a:xfrm>
-          <a:prstGeom prst="rect">
-            <a:avLst/>
-          </a:prstGeom>
-          <a:noFill/>
-          <a:ln>
-            <a:noFill/>
-          </a:ln>
-          <a:extLst>
-            <a:ext uri="{909E8E84-426E-40DD-AFC4-6F175D3DCCD1}">
-              <a14:hiddenFill xmlns:a14="http://schemas.microsoft.com/office/drawing/2010/main">
-                <a:solidFill>
-                  <a:schemeClr val="accent1"/>
-                </a:solidFill>
-              </a14:hiddenFill>
-            </a:ext>
-            <a:ext uri="{91240B29-F687-4F45-9708-019B960494DF}">
-              <a14:hiddenLine xmlns:a14="http://schemas.microsoft.com/office/drawing/2010/main" w="9525">
-                <a:solidFill>
-                  <a:schemeClr val="tx1"/>
-                </a:solidFill>
-                <a:miter lim="800000"/>
-                <a:headEnd/>
-                <a:tailEnd/>
-              </a14:hiddenLine>
-            </a:ext>
-          </a:extLst>
-        </p:spPr>
-      </p:pic>
     </p:spTree>
     <p:extLst>
       <p:ext uri="{BB962C8B-B14F-4D97-AF65-F5344CB8AC3E}">
-        <p14:creationId xmlns:p14="http://schemas.microsoft.com/office/powerpoint/2010/main" val="1853011509"/>
+        <p14:creationId xmlns:p14="http://schemas.microsoft.com/office/powerpoint/2010/main" val="3076933511"/>
       </p:ext>
     </p:extLst>
   </p:cSld>
@@ -5347,8 +4949,8 @@
         </p:blipFill>
         <p:spPr bwMode="auto">
           <a:xfrm>
-            <a:off x="825639" y="838200"/>
-            <a:ext cx="7552721" cy="5638800"/>
+            <a:off x="1142883" y="1600200"/>
+            <a:ext cx="6537105" cy="4267200"/>
           </a:xfrm>
           <a:prstGeom prst="rect">
             <a:avLst/>
@@ -5381,7 +4983,7 @@
     </p:spTree>
     <p:extLst>
       <p:ext uri="{BB962C8B-B14F-4D97-AF65-F5344CB8AC3E}">
-        <p14:creationId xmlns:p14="http://schemas.microsoft.com/office/powerpoint/2010/main" val="1232756433"/>
+        <p14:creationId xmlns:p14="http://schemas.microsoft.com/office/powerpoint/2010/main" val="2510558595"/>
       </p:ext>
     </p:extLst>
   </p:cSld>
@@ -5410,7 +5012,7 @@
       </p:grpSpPr>
       <p:pic>
         <p:nvPicPr>
-          <p:cNvPr id="20482" name="Picture 2"/>
+          <p:cNvPr id="15362" name="Picture 2"/>
           <p:cNvPicPr>
             <a:picLocks noChangeAspect="1" noChangeArrowheads="1"/>
           </p:cNvPicPr>
@@ -5431,8 +5033,8 @@
         </p:blipFill>
         <p:spPr bwMode="auto">
           <a:xfrm>
-            <a:off x="30982" y="3767388"/>
-            <a:ext cx="4610673" cy="2957898"/>
+            <a:off x="0" y="838200"/>
+            <a:ext cx="4887884" cy="3370142"/>
           </a:xfrm>
           <a:prstGeom prst="rect">
             <a:avLst/>
@@ -5471,7 +5073,7 @@
         <p:spPr>
           <a:xfrm>
             <a:off x="0" y="0"/>
-            <a:ext cx="4641655" cy="369332"/>
+            <a:ext cx="2627642" cy="369332"/>
           </a:xfrm>
           <a:prstGeom prst="rect">
             <a:avLst/>
@@ -5486,30 +5088,76 @@
           <a:p>
             <a:r>
               <a:rPr lang="ja-JP" altLang="en-US" dirty="0" smtClean="0"/>
-              <a:t>バグ７．</a:t>
-            </a:r>
-            <a:r>
-              <a:rPr lang="en-US" altLang="ja-JP" dirty="0" smtClean="0"/>
-              <a:t>Example</a:t>
-            </a:r>
-            <a:r>
-              <a:rPr lang="ja-JP" altLang="en-US" dirty="0" smtClean="0"/>
-              <a:t>とは言え、エッジが短すぎる？</a:t>
+              <a:t>バグ２．鋭角過ぎるエッジ</a:t>
             </a:r>
             <a:endParaRPr lang="en-US" dirty="0"/>
           </a:p>
         </p:txBody>
       </p:sp>
-      <p:sp>
-        <p:nvSpPr>
-          <p:cNvPr id="4" name="Oval 3"/>
+      <p:pic>
+        <p:nvPicPr>
+          <p:cNvPr id="15363" name="Picture 3"/>
+          <p:cNvPicPr>
+            <a:picLocks noChangeAspect="1" noChangeArrowheads="1"/>
+          </p:cNvPicPr>
+          <p:nvPr/>
+        </p:nvPicPr>
+        <p:blipFill>
+          <a:blip r:embed="rId3">
+            <a:extLst>
+              <a:ext uri="{28A0092B-C50C-407E-A947-70E740481C1C}">
+                <a14:useLocalDpi xmlns:a14="http://schemas.microsoft.com/office/drawing/2010/main" val="0"/>
+              </a:ext>
+            </a:extLst>
+          </a:blip>
+          <a:srcRect/>
+          <a:stretch>
+            <a:fillRect/>
+          </a:stretch>
+        </p:blipFill>
+        <p:spPr bwMode="auto">
+          <a:xfrm>
+            <a:off x="4191000" y="2873447"/>
+            <a:ext cx="4861386" cy="3908353"/>
+          </a:xfrm>
+          <a:prstGeom prst="rect">
+            <a:avLst/>
+          </a:prstGeom>
+          <a:noFill/>
+          <a:ln>
+            <a:noFill/>
+          </a:ln>
+          <a:extLst>
+            <a:ext uri="{909E8E84-426E-40DD-AFC4-6F175D3DCCD1}">
+              <a14:hiddenFill xmlns:a14="http://schemas.microsoft.com/office/drawing/2010/main">
+                <a:solidFill>
+                  <a:schemeClr val="accent1"/>
+                </a:solidFill>
+              </a14:hiddenFill>
+            </a:ext>
+            <a:ext uri="{91240B29-F687-4F45-9708-019B960494DF}">
+              <a14:hiddenLine xmlns:a14="http://schemas.microsoft.com/office/drawing/2010/main" w="9525">
+                <a:solidFill>
+                  <a:schemeClr val="tx1"/>
+                </a:solidFill>
+                <a:miter lim="800000"/>
+                <a:headEnd/>
+                <a:tailEnd/>
+              </a14:hiddenLine>
+            </a:ext>
+          </a:extLst>
+        </p:spPr>
+      </p:pic>
+      <p:sp>
+        <p:nvSpPr>
+          <p:cNvPr id="5" name="Oval 4"/>
           <p:cNvSpPr/>
           <p:nvPr/>
         </p:nvSpPr>
         <p:spPr>
           <a:xfrm rot="5400000">
-            <a:off x="2612405" y="4968988"/>
-            <a:ext cx="947389" cy="987198"/>
+            <a:off x="6170263" y="3659537"/>
+            <a:ext cx="1295400" cy="1443927"/>
           </a:xfrm>
           <a:prstGeom prst="ellipse">
             <a:avLst/>
@@ -5547,60 +5195,6 @@
           </a:p>
         </p:txBody>
       </p:sp>
-      <p:pic>
-        <p:nvPicPr>
-          <p:cNvPr id="20483" name="Picture 3"/>
-          <p:cNvPicPr>
-            <a:picLocks noChangeAspect="1" noChangeArrowheads="1"/>
-          </p:cNvPicPr>
-          <p:nvPr/>
-        </p:nvPicPr>
-        <p:blipFill>
-          <a:blip r:embed="rId3">
-            <a:extLst>
-              <a:ext uri="{28A0092B-C50C-407E-A947-70E740481C1C}">
-                <a14:useLocalDpi xmlns:a14="http://schemas.microsoft.com/office/drawing/2010/main" val="0"/>
-              </a:ext>
-            </a:extLst>
-          </a:blip>
-          <a:srcRect/>
-          <a:stretch>
-            <a:fillRect/>
-          </a:stretch>
-        </p:blipFill>
-        <p:spPr bwMode="auto">
-          <a:xfrm>
-            <a:off x="4660104" y="2743200"/>
-            <a:ext cx="4452914" cy="2719387"/>
-          </a:xfrm>
-          <a:prstGeom prst="rect">
-            <a:avLst/>
-          </a:prstGeom>
-          <a:noFill/>
-          <a:ln>
-            <a:noFill/>
-          </a:ln>
-          <a:extLst>
-            <a:ext uri="{909E8E84-426E-40DD-AFC4-6F175D3DCCD1}">
-              <a14:hiddenFill xmlns:a14="http://schemas.microsoft.com/office/drawing/2010/main">
-                <a:solidFill>
-                  <a:schemeClr val="accent1"/>
-                </a:solidFill>
-              </a14:hiddenFill>
-            </a:ext>
-            <a:ext uri="{91240B29-F687-4F45-9708-019B960494DF}">
-              <a14:hiddenLine xmlns:a14="http://schemas.microsoft.com/office/drawing/2010/main" w="9525">
-                <a:solidFill>
-                  <a:schemeClr val="tx1"/>
-                </a:solidFill>
-                <a:miter lim="800000"/>
-                <a:headEnd/>
-                <a:tailEnd/>
-              </a14:hiddenLine>
-            </a:ext>
-          </a:extLst>
-        </p:spPr>
-      </p:pic>
       <p:sp>
         <p:nvSpPr>
           <p:cNvPr id="6" name="Oval 5"/>
@@ -5609,8 +5203,8 @@
         </p:nvSpPr>
         <p:spPr>
           <a:xfrm rot="5400000">
-            <a:off x="6362038" y="3330760"/>
-            <a:ext cx="1049044" cy="1093125"/>
+            <a:off x="1852185" y="2233187"/>
+            <a:ext cx="1858230" cy="1143000"/>
           </a:xfrm>
           <a:prstGeom prst="ellipse">
             <a:avLst/>
@@ -5650,7 +5244,7 @@
       </p:sp>
       <p:pic>
         <p:nvPicPr>
-          <p:cNvPr id="20484" name="Picture 4"/>
+          <p:cNvPr id="15364" name="Picture 4"/>
           <p:cNvPicPr>
             <a:picLocks noChangeAspect="1" noChangeArrowheads="1"/>
           </p:cNvPicPr>
@@ -5671,8 +5265,8 @@
         </p:blipFill>
         <p:spPr bwMode="auto">
           <a:xfrm>
-            <a:off x="5133793" y="576263"/>
-            <a:ext cx="3505534" cy="2166937"/>
+            <a:off x="6365002" y="253241"/>
+            <a:ext cx="2349850" cy="2551446"/>
           </a:xfrm>
           <a:prstGeom prst="rect">
             <a:avLst/>
@@ -5710,8 +5304,8 @@
         </p:nvSpPr>
         <p:spPr>
           <a:xfrm rot="5400000">
-            <a:off x="6727640" y="663760"/>
-            <a:ext cx="1049044" cy="1093125"/>
+            <a:off x="7044215" y="309192"/>
+            <a:ext cx="1049044" cy="1169325"/>
           </a:xfrm>
           <a:prstGeom prst="ellipse">
             <a:avLst/>
@@ -5749,10 +5343,111 @@
           </a:p>
         </p:txBody>
       </p:sp>
+      <p:pic>
+        <p:nvPicPr>
+          <p:cNvPr id="15365" name="Picture 5"/>
+          <p:cNvPicPr>
+            <a:picLocks noChangeAspect="1" noChangeArrowheads="1"/>
+          </p:cNvPicPr>
+          <p:nvPr/>
+        </p:nvPicPr>
+        <p:blipFill>
+          <a:blip r:embed="rId5" cstate="print">
+            <a:extLst>
+              <a:ext uri="{28A0092B-C50C-407E-A947-70E740481C1C}">
+                <a14:useLocalDpi xmlns:a14="http://schemas.microsoft.com/office/drawing/2010/main" val="0"/>
+              </a:ext>
+            </a:extLst>
+          </a:blip>
+          <a:srcRect/>
+          <a:stretch>
+            <a:fillRect/>
+          </a:stretch>
+        </p:blipFill>
+        <p:spPr bwMode="auto">
+          <a:xfrm>
+            <a:off x="533400" y="4827623"/>
+            <a:ext cx="3011362" cy="1557337"/>
+          </a:xfrm>
+          <a:prstGeom prst="rect">
+            <a:avLst/>
+          </a:prstGeom>
+          <a:noFill/>
+          <a:ln>
+            <a:noFill/>
+          </a:ln>
+          <a:extLst>
+            <a:ext uri="{909E8E84-426E-40DD-AFC4-6F175D3DCCD1}">
+              <a14:hiddenFill xmlns:a14="http://schemas.microsoft.com/office/drawing/2010/main">
+                <a:solidFill>
+                  <a:schemeClr val="accent1"/>
+                </a:solidFill>
+              </a14:hiddenFill>
+            </a:ext>
+            <a:ext uri="{91240B29-F687-4F45-9708-019B960494DF}">
+              <a14:hiddenLine xmlns:a14="http://schemas.microsoft.com/office/drawing/2010/main" w="9525">
+                <a:solidFill>
+                  <a:schemeClr val="tx1"/>
+                </a:solidFill>
+                <a:miter lim="800000"/>
+                <a:headEnd/>
+                <a:tailEnd/>
+              </a14:hiddenLine>
+            </a:ext>
+          </a:extLst>
+        </p:spPr>
+      </p:pic>
+      <p:sp>
+        <p:nvSpPr>
+          <p:cNvPr id="10" name="Oval 9"/>
+          <p:cNvSpPr/>
+          <p:nvPr/>
+        </p:nvSpPr>
+        <p:spPr>
+          <a:xfrm rot="5400000">
+            <a:off x="1402431" y="4816660"/>
+            <a:ext cx="1049044" cy="1169325"/>
+          </a:xfrm>
+          <a:prstGeom prst="ellipse">
+            <a:avLst/>
+          </a:prstGeom>
+          <a:noFill/>
+          <a:ln w="47625">
+            <a:solidFill>
+              <a:srgbClr val="0000FF"/>
+            </a:solidFill>
+            <a:prstDash val="dash"/>
+          </a:ln>
+        </p:spPr>
+        <p:style>
+          <a:lnRef idx="2">
+            <a:schemeClr val="accent1">
+              <a:shade val="50000"/>
+            </a:schemeClr>
+          </a:lnRef>
+          <a:fillRef idx="1">
+            <a:schemeClr val="accent1"/>
+          </a:fillRef>
+          <a:effectRef idx="0">
+            <a:schemeClr val="accent1"/>
+          </a:effectRef>
+          <a:fontRef idx="minor">
+            <a:schemeClr val="lt1"/>
+          </a:fontRef>
+        </p:style>
+        <p:txBody>
+          <a:bodyPr rtlCol="0" anchor="ctr"/>
+          <a:lstStyle/>
+          <a:p>
+            <a:pPr algn="ctr"/>
+            <a:endParaRPr lang="en-US"/>
+          </a:p>
+        </p:txBody>
+      </p:sp>
     </p:spTree>
     <p:extLst>
       <p:ext uri="{BB962C8B-B14F-4D97-AF65-F5344CB8AC3E}">
-        <p14:creationId xmlns:p14="http://schemas.microsoft.com/office/powerpoint/2010/main" val="2035916575"/>
+        <p14:creationId xmlns:p14="http://schemas.microsoft.com/office/powerpoint/2010/main" val="142476919"/>
       </p:ext>
     </p:extLst>
   </p:cSld>
@@ -5781,7 +5476,7 @@
       </p:grpSpPr>
       <p:pic>
         <p:nvPicPr>
-          <p:cNvPr id="21506" name="Picture 2"/>
+          <p:cNvPr id="16386" name="Picture 2"/>
           <p:cNvPicPr>
             <a:picLocks noChangeAspect="1" noChangeArrowheads="1"/>
           </p:cNvPicPr>
@@ -5802,8 +5497,8 @@
         </p:blipFill>
         <p:spPr bwMode="auto">
           <a:xfrm>
-            <a:off x="1676400" y="2667000"/>
-            <a:ext cx="5483986" cy="3633788"/>
+            <a:off x="1828800" y="1600200"/>
+            <a:ext cx="4978429" cy="4852988"/>
           </a:xfrm>
           <a:prstGeom prst="rect">
             <a:avLst/>
@@ -5842,7 +5537,7 @@
         <p:spPr>
           <a:xfrm>
             <a:off x="0" y="0"/>
-            <a:ext cx="3541354" cy="369332"/>
+            <a:ext cx="4564070" cy="369332"/>
           </a:xfrm>
           <a:prstGeom prst="rect">
             <a:avLst/>
@@ -5857,7 +5552,7 @@
           <a:p>
             <a:r>
               <a:rPr lang="ja-JP" altLang="en-US" dirty="0" smtClean="0"/>
-              <a:t>バグ８．エッジ間の距離が近すぎる</a:t>
+              <a:t>バグ３．円なのに、なんで赤色になってない？</a:t>
             </a:r>
             <a:endParaRPr lang="en-US" dirty="0"/>
           </a:p>
@@ -5866,7 +5561,7 @@
     </p:spTree>
     <p:extLst>
       <p:ext uri="{BB962C8B-B14F-4D97-AF65-F5344CB8AC3E}">
-        <p14:creationId xmlns:p14="http://schemas.microsoft.com/office/powerpoint/2010/main" val="4285487172"/>
+        <p14:creationId xmlns:p14="http://schemas.microsoft.com/office/powerpoint/2010/main" val="3852474453"/>
       </p:ext>
     </p:extLst>
   </p:cSld>
@@ -5895,7 +5590,7 @@
       </p:grpSpPr>
       <p:pic>
         <p:nvPicPr>
-          <p:cNvPr id="22530" name="Picture 2"/>
+          <p:cNvPr id="17410" name="Picture 2"/>
           <p:cNvPicPr>
             <a:picLocks noChangeAspect="1" noChangeArrowheads="1"/>
           </p:cNvPicPr>
@@ -5916,6 +5611,1059 @@
         </p:blipFill>
         <p:spPr bwMode="auto">
           <a:xfrm>
+            <a:off x="301921" y="914400"/>
+            <a:ext cx="4574879" cy="3383333"/>
+          </a:xfrm>
+          <a:prstGeom prst="rect">
+            <a:avLst/>
+          </a:prstGeom>
+          <a:noFill/>
+          <a:ln>
+            <a:noFill/>
+          </a:ln>
+          <a:extLst>
+            <a:ext uri="{909E8E84-426E-40DD-AFC4-6F175D3DCCD1}">
+              <a14:hiddenFill xmlns:a14="http://schemas.microsoft.com/office/drawing/2010/main">
+                <a:solidFill>
+                  <a:schemeClr val="accent1"/>
+                </a:solidFill>
+              </a14:hiddenFill>
+            </a:ext>
+            <a:ext uri="{91240B29-F687-4F45-9708-019B960494DF}">
+              <a14:hiddenLine xmlns:a14="http://schemas.microsoft.com/office/drawing/2010/main" w="9525">
+                <a:solidFill>
+                  <a:schemeClr val="tx1"/>
+                </a:solidFill>
+                <a:miter lim="800000"/>
+                <a:headEnd/>
+                <a:tailEnd/>
+              </a14:hiddenLine>
+            </a:ext>
+          </a:extLst>
+        </p:spPr>
+      </p:pic>
+      <p:sp>
+        <p:nvSpPr>
+          <p:cNvPr id="3" name="TextBox 2"/>
+          <p:cNvSpPr txBox="1"/>
+          <p:nvPr/>
+        </p:nvSpPr>
+        <p:spPr>
+          <a:xfrm>
+            <a:off x="0" y="0"/>
+            <a:ext cx="3018775" cy="369332"/>
+          </a:xfrm>
+          <a:prstGeom prst="rect">
+            <a:avLst/>
+          </a:prstGeom>
+          <a:noFill/>
+        </p:spPr>
+        <p:txBody>
+          <a:bodyPr wrap="none" rtlCol="0">
+            <a:spAutoFit/>
+          </a:bodyPr>
+          <a:lstStyle/>
+          <a:p>
+            <a:r>
+              <a:rPr lang="ja-JP" altLang="en-US" dirty="0" smtClean="0"/>
+              <a:t>バグ４．交差しちゃっている？</a:t>
+            </a:r>
+            <a:endParaRPr lang="en-US" dirty="0"/>
+          </a:p>
+        </p:txBody>
+      </p:sp>
+      <p:pic>
+        <p:nvPicPr>
+          <p:cNvPr id="17411" name="Picture 3"/>
+          <p:cNvPicPr>
+            <a:picLocks noChangeAspect="1" noChangeArrowheads="1"/>
+          </p:cNvPicPr>
+          <p:nvPr/>
+        </p:nvPicPr>
+        <p:blipFill>
+          <a:blip r:embed="rId3">
+            <a:extLst>
+              <a:ext uri="{28A0092B-C50C-407E-A947-70E740481C1C}">
+                <a14:useLocalDpi xmlns:a14="http://schemas.microsoft.com/office/drawing/2010/main" val="0"/>
+              </a:ext>
+            </a:extLst>
+          </a:blip>
+          <a:srcRect/>
+          <a:stretch>
+            <a:fillRect/>
+          </a:stretch>
+        </p:blipFill>
+        <p:spPr bwMode="auto">
+          <a:xfrm>
+            <a:off x="4419600" y="4014510"/>
+            <a:ext cx="4267200" cy="2677044"/>
+          </a:xfrm>
+          <a:prstGeom prst="rect">
+            <a:avLst/>
+          </a:prstGeom>
+          <a:noFill/>
+          <a:ln>
+            <a:noFill/>
+          </a:ln>
+          <a:extLst>
+            <a:ext uri="{909E8E84-426E-40DD-AFC4-6F175D3DCCD1}">
+              <a14:hiddenFill xmlns:a14="http://schemas.microsoft.com/office/drawing/2010/main">
+                <a:solidFill>
+                  <a:schemeClr val="accent1"/>
+                </a:solidFill>
+              </a14:hiddenFill>
+            </a:ext>
+            <a:ext uri="{91240B29-F687-4F45-9708-019B960494DF}">
+              <a14:hiddenLine xmlns:a14="http://schemas.microsoft.com/office/drawing/2010/main" w="9525">
+                <a:solidFill>
+                  <a:schemeClr val="tx1"/>
+                </a:solidFill>
+                <a:miter lim="800000"/>
+                <a:headEnd/>
+                <a:tailEnd/>
+              </a14:hiddenLine>
+            </a:ext>
+          </a:extLst>
+        </p:spPr>
+      </p:pic>
+      <p:sp>
+        <p:nvSpPr>
+          <p:cNvPr id="6" name="Oval 5"/>
+          <p:cNvSpPr/>
+          <p:nvPr/>
+        </p:nvSpPr>
+        <p:spPr>
+          <a:xfrm rot="5400000">
+            <a:off x="1966486" y="1767314"/>
+            <a:ext cx="1705828" cy="914400"/>
+          </a:xfrm>
+          <a:prstGeom prst="ellipse">
+            <a:avLst/>
+          </a:prstGeom>
+          <a:noFill/>
+          <a:ln w="47625">
+            <a:solidFill>
+              <a:srgbClr val="0000FF"/>
+            </a:solidFill>
+            <a:prstDash val="dash"/>
+          </a:ln>
+        </p:spPr>
+        <p:style>
+          <a:lnRef idx="2">
+            <a:schemeClr val="accent1">
+              <a:shade val="50000"/>
+            </a:schemeClr>
+          </a:lnRef>
+          <a:fillRef idx="1">
+            <a:schemeClr val="accent1"/>
+          </a:fillRef>
+          <a:effectRef idx="0">
+            <a:schemeClr val="accent1"/>
+          </a:effectRef>
+          <a:fontRef idx="minor">
+            <a:schemeClr val="lt1"/>
+          </a:fontRef>
+        </p:style>
+        <p:txBody>
+          <a:bodyPr rtlCol="0" anchor="ctr"/>
+          <a:lstStyle/>
+          <a:p>
+            <a:pPr algn="ctr"/>
+            <a:endParaRPr lang="en-US"/>
+          </a:p>
+        </p:txBody>
+      </p:sp>
+      <p:sp>
+        <p:nvSpPr>
+          <p:cNvPr id="7" name="Oval 6"/>
+          <p:cNvSpPr/>
+          <p:nvPr/>
+        </p:nvSpPr>
+        <p:spPr>
+          <a:xfrm rot="934534">
+            <a:off x="5547886" y="4815314"/>
+            <a:ext cx="1705828" cy="914400"/>
+          </a:xfrm>
+          <a:prstGeom prst="ellipse">
+            <a:avLst/>
+          </a:prstGeom>
+          <a:noFill/>
+          <a:ln w="47625">
+            <a:solidFill>
+              <a:srgbClr val="0000FF"/>
+            </a:solidFill>
+            <a:prstDash val="dash"/>
+          </a:ln>
+        </p:spPr>
+        <p:style>
+          <a:lnRef idx="2">
+            <a:schemeClr val="accent1">
+              <a:shade val="50000"/>
+            </a:schemeClr>
+          </a:lnRef>
+          <a:fillRef idx="1">
+            <a:schemeClr val="accent1"/>
+          </a:fillRef>
+          <a:effectRef idx="0">
+            <a:schemeClr val="accent1"/>
+          </a:effectRef>
+          <a:fontRef idx="minor">
+            <a:schemeClr val="lt1"/>
+          </a:fontRef>
+        </p:style>
+        <p:txBody>
+          <a:bodyPr rtlCol="0" anchor="ctr"/>
+          <a:lstStyle/>
+          <a:p>
+            <a:pPr algn="ctr"/>
+            <a:endParaRPr lang="en-US"/>
+          </a:p>
+        </p:txBody>
+      </p:sp>
+    </p:spTree>
+    <p:extLst>
+      <p:ext uri="{BB962C8B-B14F-4D97-AF65-F5344CB8AC3E}">
+        <p14:creationId xmlns:p14="http://schemas.microsoft.com/office/powerpoint/2010/main" val="2615965870"/>
+      </p:ext>
+    </p:extLst>
+  </p:cSld>
+  <p:clrMapOvr>
+    <a:masterClrMapping/>
+  </p:clrMapOvr>
+</p:sld>
+</file>
+
+<file path=ppt/slides/slide23.xml><?xml version="1.0" encoding="utf-8"?>
+<p:sld xmlns:a="http://schemas.openxmlformats.org/drawingml/2006/main" xmlns:r="http://schemas.openxmlformats.org/officeDocument/2006/relationships" xmlns:p="http://schemas.openxmlformats.org/presentationml/2006/main">
+  <p:cSld>
+    <p:spTree>
+      <p:nvGrpSpPr>
+        <p:cNvPr id="1" name=""/>
+        <p:cNvGrpSpPr/>
+        <p:nvPr/>
+      </p:nvGrpSpPr>
+      <p:grpSpPr>
+        <a:xfrm>
+          <a:off x="0" y="0"/>
+          <a:ext cx="0" cy="0"/>
+          <a:chOff x="0" y="0"/>
+          <a:chExt cx="0" cy="0"/>
+        </a:xfrm>
+      </p:grpSpPr>
+      <p:pic>
+        <p:nvPicPr>
+          <p:cNvPr id="18434" name="Picture 2"/>
+          <p:cNvPicPr>
+            <a:picLocks noChangeAspect="1" noChangeArrowheads="1"/>
+          </p:cNvPicPr>
+          <p:nvPr/>
+        </p:nvPicPr>
+        <p:blipFill>
+          <a:blip r:embed="rId2">
+            <a:extLst>
+              <a:ext uri="{28A0092B-C50C-407E-A947-70E740481C1C}">
+                <a14:useLocalDpi xmlns:a14="http://schemas.microsoft.com/office/drawing/2010/main" val="0"/>
+              </a:ext>
+            </a:extLst>
+          </a:blip>
+          <a:srcRect/>
+          <a:stretch>
+            <a:fillRect/>
+          </a:stretch>
+        </p:blipFill>
+        <p:spPr bwMode="auto">
+          <a:xfrm>
+            <a:off x="1295400" y="1447800"/>
+            <a:ext cx="6196012" cy="4736537"/>
+          </a:xfrm>
+          <a:prstGeom prst="rect">
+            <a:avLst/>
+          </a:prstGeom>
+          <a:noFill/>
+          <a:ln>
+            <a:noFill/>
+          </a:ln>
+          <a:extLst>
+            <a:ext uri="{909E8E84-426E-40DD-AFC4-6F175D3DCCD1}">
+              <a14:hiddenFill xmlns:a14="http://schemas.microsoft.com/office/drawing/2010/main">
+                <a:solidFill>
+                  <a:schemeClr val="accent1"/>
+                </a:solidFill>
+              </a14:hiddenFill>
+            </a:ext>
+            <a:ext uri="{91240B29-F687-4F45-9708-019B960494DF}">
+              <a14:hiddenLine xmlns:a14="http://schemas.microsoft.com/office/drawing/2010/main" w="9525">
+                <a:solidFill>
+                  <a:schemeClr val="tx1"/>
+                </a:solidFill>
+                <a:miter lim="800000"/>
+                <a:headEnd/>
+                <a:tailEnd/>
+              </a14:hiddenLine>
+            </a:ext>
+          </a:extLst>
+        </p:spPr>
+      </p:pic>
+      <p:sp>
+        <p:nvSpPr>
+          <p:cNvPr id="3" name="TextBox 2"/>
+          <p:cNvSpPr txBox="1"/>
+          <p:nvPr/>
+        </p:nvSpPr>
+        <p:spPr>
+          <a:xfrm>
+            <a:off x="0" y="0"/>
+            <a:ext cx="6084999" cy="369332"/>
+          </a:xfrm>
+          <a:prstGeom prst="rect">
+            <a:avLst/>
+          </a:prstGeom>
+          <a:noFill/>
+        </p:spPr>
+        <p:txBody>
+          <a:bodyPr wrap="none" rtlCol="0">
+            <a:spAutoFit/>
+          </a:bodyPr>
+          <a:lstStyle/>
+          <a:p>
+            <a:r>
+              <a:rPr lang="ja-JP" altLang="en-US" dirty="0" smtClean="0"/>
+              <a:t>バグ５．</a:t>
+            </a:r>
+            <a:r>
+              <a:rPr lang="en-US" altLang="ja-JP" dirty="0" smtClean="0"/>
+              <a:t>Block</a:t>
+            </a:r>
+            <a:r>
+              <a:rPr lang="ja-JP" altLang="en-US" dirty="0" smtClean="0"/>
+              <a:t>は作成されいているのに、</a:t>
+            </a:r>
+            <a:r>
+              <a:rPr lang="en-US" altLang="ja-JP" dirty="0" smtClean="0"/>
+              <a:t>Parcel</a:t>
+            </a:r>
+            <a:r>
+              <a:rPr lang="ja-JP" altLang="en-US" dirty="0" smtClean="0"/>
+              <a:t>が作成されない</a:t>
+            </a:r>
+            <a:endParaRPr lang="en-US" dirty="0"/>
+          </a:p>
+        </p:txBody>
+      </p:sp>
+    </p:spTree>
+    <p:extLst>
+      <p:ext uri="{BB962C8B-B14F-4D97-AF65-F5344CB8AC3E}">
+        <p14:creationId xmlns:p14="http://schemas.microsoft.com/office/powerpoint/2010/main" val="732611421"/>
+      </p:ext>
+    </p:extLst>
+  </p:cSld>
+  <p:clrMapOvr>
+    <a:masterClrMapping/>
+  </p:clrMapOvr>
+</p:sld>
+</file>
+
+<file path=ppt/slides/slide24.xml><?xml version="1.0" encoding="utf-8"?>
+<p:sld xmlns:a="http://schemas.openxmlformats.org/drawingml/2006/main" xmlns:r="http://schemas.openxmlformats.org/officeDocument/2006/relationships" xmlns:p="http://schemas.openxmlformats.org/presentationml/2006/main">
+  <p:cSld>
+    <p:spTree>
+      <p:nvGrpSpPr>
+        <p:cNvPr id="1" name=""/>
+        <p:cNvGrpSpPr/>
+        <p:nvPr/>
+      </p:nvGrpSpPr>
+      <p:grpSpPr>
+        <a:xfrm>
+          <a:off x="0" y="0"/>
+          <a:ext cx="0" cy="0"/>
+          <a:chOff x="0" y="0"/>
+          <a:chExt cx="0" cy="0"/>
+        </a:xfrm>
+      </p:grpSpPr>
+      <p:pic>
+        <p:nvPicPr>
+          <p:cNvPr id="19458" name="Picture 2"/>
+          <p:cNvPicPr>
+            <a:picLocks noChangeAspect="1" noChangeArrowheads="1"/>
+          </p:cNvPicPr>
+          <p:nvPr/>
+        </p:nvPicPr>
+        <p:blipFill>
+          <a:blip r:embed="rId2">
+            <a:extLst>
+              <a:ext uri="{28A0092B-C50C-407E-A947-70E740481C1C}">
+                <a14:useLocalDpi xmlns:a14="http://schemas.microsoft.com/office/drawing/2010/main" val="0"/>
+              </a:ext>
+            </a:extLst>
+          </a:blip>
+          <a:srcRect/>
+          <a:stretch>
+            <a:fillRect/>
+          </a:stretch>
+        </p:blipFill>
+        <p:spPr bwMode="auto">
+          <a:xfrm>
+            <a:off x="4724400" y="3124200"/>
+            <a:ext cx="4143375" cy="3343275"/>
+          </a:xfrm>
+          <a:prstGeom prst="rect">
+            <a:avLst/>
+          </a:prstGeom>
+          <a:noFill/>
+          <a:ln>
+            <a:noFill/>
+          </a:ln>
+          <a:extLst>
+            <a:ext uri="{909E8E84-426E-40DD-AFC4-6F175D3DCCD1}">
+              <a14:hiddenFill xmlns:a14="http://schemas.microsoft.com/office/drawing/2010/main">
+                <a:solidFill>
+                  <a:schemeClr val="accent1"/>
+                </a:solidFill>
+              </a14:hiddenFill>
+            </a:ext>
+            <a:ext uri="{91240B29-F687-4F45-9708-019B960494DF}">
+              <a14:hiddenLine xmlns:a14="http://schemas.microsoft.com/office/drawing/2010/main" w="9525">
+                <a:solidFill>
+                  <a:schemeClr val="tx1"/>
+                </a:solidFill>
+                <a:miter lim="800000"/>
+                <a:headEnd/>
+                <a:tailEnd/>
+              </a14:hiddenLine>
+            </a:ext>
+          </a:extLst>
+        </p:spPr>
+      </p:pic>
+      <p:sp>
+        <p:nvSpPr>
+          <p:cNvPr id="3" name="TextBox 2"/>
+          <p:cNvSpPr txBox="1"/>
+          <p:nvPr/>
+        </p:nvSpPr>
+        <p:spPr>
+          <a:xfrm>
+            <a:off x="0" y="0"/>
+            <a:ext cx="3913251" cy="369332"/>
+          </a:xfrm>
+          <a:prstGeom prst="rect">
+            <a:avLst/>
+          </a:prstGeom>
+          <a:noFill/>
+        </p:spPr>
+        <p:txBody>
+          <a:bodyPr wrap="none" rtlCol="0">
+            <a:spAutoFit/>
+          </a:bodyPr>
+          <a:lstStyle/>
+          <a:p>
+            <a:r>
+              <a:rPr lang="ja-JP" altLang="en-US" dirty="0" smtClean="0"/>
+              <a:t>バグ</a:t>
+            </a:r>
+            <a:r>
+              <a:rPr lang="ja-JP" altLang="en-US" dirty="0"/>
+              <a:t>６</a:t>
+            </a:r>
+            <a:r>
+              <a:rPr lang="ja-JP" altLang="en-US" dirty="0" smtClean="0"/>
+              <a:t>．頂点が他のエッジに近すぎる。</a:t>
+            </a:r>
+            <a:endParaRPr lang="en-US" dirty="0"/>
+          </a:p>
+        </p:txBody>
+      </p:sp>
+      <p:pic>
+        <p:nvPicPr>
+          <p:cNvPr id="19459" name="Picture 3"/>
+          <p:cNvPicPr>
+            <a:picLocks noChangeAspect="1" noChangeArrowheads="1"/>
+          </p:cNvPicPr>
+          <p:nvPr/>
+        </p:nvPicPr>
+        <p:blipFill>
+          <a:blip r:embed="rId3">
+            <a:extLst>
+              <a:ext uri="{28A0092B-C50C-407E-A947-70E740481C1C}">
+                <a14:useLocalDpi xmlns:a14="http://schemas.microsoft.com/office/drawing/2010/main" val="0"/>
+              </a:ext>
+            </a:extLst>
+          </a:blip>
+          <a:srcRect/>
+          <a:stretch>
+            <a:fillRect/>
+          </a:stretch>
+        </p:blipFill>
+        <p:spPr bwMode="auto">
+          <a:xfrm>
+            <a:off x="381000" y="1066800"/>
+            <a:ext cx="3753684" cy="2438400"/>
+          </a:xfrm>
+          <a:prstGeom prst="rect">
+            <a:avLst/>
+          </a:prstGeom>
+          <a:noFill/>
+          <a:ln>
+            <a:noFill/>
+          </a:ln>
+          <a:extLst>
+            <a:ext uri="{909E8E84-426E-40DD-AFC4-6F175D3DCCD1}">
+              <a14:hiddenFill xmlns:a14="http://schemas.microsoft.com/office/drawing/2010/main">
+                <a:solidFill>
+                  <a:schemeClr val="accent1"/>
+                </a:solidFill>
+              </a14:hiddenFill>
+            </a:ext>
+            <a:ext uri="{91240B29-F687-4F45-9708-019B960494DF}">
+              <a14:hiddenLine xmlns:a14="http://schemas.microsoft.com/office/drawing/2010/main" w="9525">
+                <a:solidFill>
+                  <a:schemeClr val="tx1"/>
+                </a:solidFill>
+                <a:miter lim="800000"/>
+                <a:headEnd/>
+                <a:tailEnd/>
+              </a14:hiddenLine>
+            </a:ext>
+          </a:extLst>
+        </p:spPr>
+      </p:pic>
+    </p:spTree>
+    <p:extLst>
+      <p:ext uri="{BB962C8B-B14F-4D97-AF65-F5344CB8AC3E}">
+        <p14:creationId xmlns:p14="http://schemas.microsoft.com/office/powerpoint/2010/main" val="1853011509"/>
+      </p:ext>
+    </p:extLst>
+  </p:cSld>
+  <p:clrMapOvr>
+    <a:masterClrMapping/>
+  </p:clrMapOvr>
+</p:sld>
+</file>
+
+<file path=ppt/slides/slide25.xml><?xml version="1.0" encoding="utf-8"?>
+<p:sld xmlns:a="http://schemas.openxmlformats.org/drawingml/2006/main" xmlns:r="http://schemas.openxmlformats.org/officeDocument/2006/relationships" xmlns:p="http://schemas.openxmlformats.org/presentationml/2006/main">
+  <p:cSld>
+    <p:spTree>
+      <p:nvGrpSpPr>
+        <p:cNvPr id="1" name=""/>
+        <p:cNvGrpSpPr/>
+        <p:nvPr/>
+      </p:nvGrpSpPr>
+      <p:grpSpPr>
+        <a:xfrm>
+          <a:off x="0" y="0"/>
+          <a:ext cx="0" cy="0"/>
+          <a:chOff x="0" y="0"/>
+          <a:chExt cx="0" cy="0"/>
+        </a:xfrm>
+      </p:grpSpPr>
+      <p:pic>
+        <p:nvPicPr>
+          <p:cNvPr id="20482" name="Picture 2"/>
+          <p:cNvPicPr>
+            <a:picLocks noChangeAspect="1" noChangeArrowheads="1"/>
+          </p:cNvPicPr>
+          <p:nvPr/>
+        </p:nvPicPr>
+        <p:blipFill>
+          <a:blip r:embed="rId2">
+            <a:extLst>
+              <a:ext uri="{28A0092B-C50C-407E-A947-70E740481C1C}">
+                <a14:useLocalDpi xmlns:a14="http://schemas.microsoft.com/office/drawing/2010/main" val="0"/>
+              </a:ext>
+            </a:extLst>
+          </a:blip>
+          <a:srcRect/>
+          <a:stretch>
+            <a:fillRect/>
+          </a:stretch>
+        </p:blipFill>
+        <p:spPr bwMode="auto">
+          <a:xfrm>
+            <a:off x="30982" y="3767388"/>
+            <a:ext cx="4610673" cy="2957898"/>
+          </a:xfrm>
+          <a:prstGeom prst="rect">
+            <a:avLst/>
+          </a:prstGeom>
+          <a:noFill/>
+          <a:ln>
+            <a:noFill/>
+          </a:ln>
+          <a:extLst>
+            <a:ext uri="{909E8E84-426E-40DD-AFC4-6F175D3DCCD1}">
+              <a14:hiddenFill xmlns:a14="http://schemas.microsoft.com/office/drawing/2010/main">
+                <a:solidFill>
+                  <a:schemeClr val="accent1"/>
+                </a:solidFill>
+              </a14:hiddenFill>
+            </a:ext>
+            <a:ext uri="{91240B29-F687-4F45-9708-019B960494DF}">
+              <a14:hiddenLine xmlns:a14="http://schemas.microsoft.com/office/drawing/2010/main" w="9525">
+                <a:solidFill>
+                  <a:schemeClr val="tx1"/>
+                </a:solidFill>
+                <a:miter lim="800000"/>
+                <a:headEnd/>
+                <a:tailEnd/>
+              </a14:hiddenLine>
+            </a:ext>
+          </a:extLst>
+        </p:spPr>
+      </p:pic>
+      <p:sp>
+        <p:nvSpPr>
+          <p:cNvPr id="3" name="TextBox 2"/>
+          <p:cNvSpPr txBox="1"/>
+          <p:nvPr/>
+        </p:nvSpPr>
+        <p:spPr>
+          <a:xfrm>
+            <a:off x="0" y="0"/>
+            <a:ext cx="4641655" cy="369332"/>
+          </a:xfrm>
+          <a:prstGeom prst="rect">
+            <a:avLst/>
+          </a:prstGeom>
+          <a:noFill/>
+        </p:spPr>
+        <p:txBody>
+          <a:bodyPr wrap="none" rtlCol="0">
+            <a:spAutoFit/>
+          </a:bodyPr>
+          <a:lstStyle/>
+          <a:p>
+            <a:r>
+              <a:rPr lang="ja-JP" altLang="en-US" dirty="0" smtClean="0"/>
+              <a:t>バグ７．</a:t>
+            </a:r>
+            <a:r>
+              <a:rPr lang="en-US" altLang="ja-JP" dirty="0" smtClean="0"/>
+              <a:t>Example</a:t>
+            </a:r>
+            <a:r>
+              <a:rPr lang="ja-JP" altLang="en-US" dirty="0" smtClean="0"/>
+              <a:t>とは言え、エッジが短すぎる？</a:t>
+            </a:r>
+            <a:endParaRPr lang="en-US" dirty="0"/>
+          </a:p>
+        </p:txBody>
+      </p:sp>
+      <p:sp>
+        <p:nvSpPr>
+          <p:cNvPr id="4" name="Oval 3"/>
+          <p:cNvSpPr/>
+          <p:nvPr/>
+        </p:nvSpPr>
+        <p:spPr>
+          <a:xfrm rot="5400000">
+            <a:off x="2612405" y="4968988"/>
+            <a:ext cx="947389" cy="987198"/>
+          </a:xfrm>
+          <a:prstGeom prst="ellipse">
+            <a:avLst/>
+          </a:prstGeom>
+          <a:noFill/>
+          <a:ln w="47625">
+            <a:solidFill>
+              <a:srgbClr val="0000FF"/>
+            </a:solidFill>
+            <a:prstDash val="dash"/>
+          </a:ln>
+        </p:spPr>
+        <p:style>
+          <a:lnRef idx="2">
+            <a:schemeClr val="accent1">
+              <a:shade val="50000"/>
+            </a:schemeClr>
+          </a:lnRef>
+          <a:fillRef idx="1">
+            <a:schemeClr val="accent1"/>
+          </a:fillRef>
+          <a:effectRef idx="0">
+            <a:schemeClr val="accent1"/>
+          </a:effectRef>
+          <a:fontRef idx="minor">
+            <a:schemeClr val="lt1"/>
+          </a:fontRef>
+        </p:style>
+        <p:txBody>
+          <a:bodyPr rtlCol="0" anchor="ctr"/>
+          <a:lstStyle/>
+          <a:p>
+            <a:pPr algn="ctr"/>
+            <a:endParaRPr lang="en-US"/>
+          </a:p>
+        </p:txBody>
+      </p:sp>
+      <p:pic>
+        <p:nvPicPr>
+          <p:cNvPr id="20483" name="Picture 3"/>
+          <p:cNvPicPr>
+            <a:picLocks noChangeAspect="1" noChangeArrowheads="1"/>
+          </p:cNvPicPr>
+          <p:nvPr/>
+        </p:nvPicPr>
+        <p:blipFill>
+          <a:blip r:embed="rId3">
+            <a:extLst>
+              <a:ext uri="{28A0092B-C50C-407E-A947-70E740481C1C}">
+                <a14:useLocalDpi xmlns:a14="http://schemas.microsoft.com/office/drawing/2010/main" val="0"/>
+              </a:ext>
+            </a:extLst>
+          </a:blip>
+          <a:srcRect/>
+          <a:stretch>
+            <a:fillRect/>
+          </a:stretch>
+        </p:blipFill>
+        <p:spPr bwMode="auto">
+          <a:xfrm>
+            <a:off x="4660104" y="2743200"/>
+            <a:ext cx="4452914" cy="2719387"/>
+          </a:xfrm>
+          <a:prstGeom prst="rect">
+            <a:avLst/>
+          </a:prstGeom>
+          <a:noFill/>
+          <a:ln>
+            <a:noFill/>
+          </a:ln>
+          <a:extLst>
+            <a:ext uri="{909E8E84-426E-40DD-AFC4-6F175D3DCCD1}">
+              <a14:hiddenFill xmlns:a14="http://schemas.microsoft.com/office/drawing/2010/main">
+                <a:solidFill>
+                  <a:schemeClr val="accent1"/>
+                </a:solidFill>
+              </a14:hiddenFill>
+            </a:ext>
+            <a:ext uri="{91240B29-F687-4F45-9708-019B960494DF}">
+              <a14:hiddenLine xmlns:a14="http://schemas.microsoft.com/office/drawing/2010/main" w="9525">
+                <a:solidFill>
+                  <a:schemeClr val="tx1"/>
+                </a:solidFill>
+                <a:miter lim="800000"/>
+                <a:headEnd/>
+                <a:tailEnd/>
+              </a14:hiddenLine>
+            </a:ext>
+          </a:extLst>
+        </p:spPr>
+      </p:pic>
+      <p:sp>
+        <p:nvSpPr>
+          <p:cNvPr id="6" name="Oval 5"/>
+          <p:cNvSpPr/>
+          <p:nvPr/>
+        </p:nvSpPr>
+        <p:spPr>
+          <a:xfrm rot="5400000">
+            <a:off x="6362038" y="3330760"/>
+            <a:ext cx="1049044" cy="1093125"/>
+          </a:xfrm>
+          <a:prstGeom prst="ellipse">
+            <a:avLst/>
+          </a:prstGeom>
+          <a:noFill/>
+          <a:ln w="47625">
+            <a:solidFill>
+              <a:srgbClr val="0000FF"/>
+            </a:solidFill>
+            <a:prstDash val="dash"/>
+          </a:ln>
+        </p:spPr>
+        <p:style>
+          <a:lnRef idx="2">
+            <a:schemeClr val="accent1">
+              <a:shade val="50000"/>
+            </a:schemeClr>
+          </a:lnRef>
+          <a:fillRef idx="1">
+            <a:schemeClr val="accent1"/>
+          </a:fillRef>
+          <a:effectRef idx="0">
+            <a:schemeClr val="accent1"/>
+          </a:effectRef>
+          <a:fontRef idx="minor">
+            <a:schemeClr val="lt1"/>
+          </a:fontRef>
+        </p:style>
+        <p:txBody>
+          <a:bodyPr rtlCol="0" anchor="ctr"/>
+          <a:lstStyle/>
+          <a:p>
+            <a:pPr algn="ctr"/>
+            <a:endParaRPr lang="en-US"/>
+          </a:p>
+        </p:txBody>
+      </p:sp>
+      <p:pic>
+        <p:nvPicPr>
+          <p:cNvPr id="20484" name="Picture 4"/>
+          <p:cNvPicPr>
+            <a:picLocks noChangeAspect="1" noChangeArrowheads="1"/>
+          </p:cNvPicPr>
+          <p:nvPr/>
+        </p:nvPicPr>
+        <p:blipFill>
+          <a:blip r:embed="rId4">
+            <a:extLst>
+              <a:ext uri="{28A0092B-C50C-407E-A947-70E740481C1C}">
+                <a14:useLocalDpi xmlns:a14="http://schemas.microsoft.com/office/drawing/2010/main" val="0"/>
+              </a:ext>
+            </a:extLst>
+          </a:blip>
+          <a:srcRect/>
+          <a:stretch>
+            <a:fillRect/>
+          </a:stretch>
+        </p:blipFill>
+        <p:spPr bwMode="auto">
+          <a:xfrm>
+            <a:off x="5133793" y="576263"/>
+            <a:ext cx="3505534" cy="2166937"/>
+          </a:xfrm>
+          <a:prstGeom prst="rect">
+            <a:avLst/>
+          </a:prstGeom>
+          <a:noFill/>
+          <a:ln>
+            <a:noFill/>
+          </a:ln>
+          <a:extLst>
+            <a:ext uri="{909E8E84-426E-40DD-AFC4-6F175D3DCCD1}">
+              <a14:hiddenFill xmlns:a14="http://schemas.microsoft.com/office/drawing/2010/main">
+                <a:solidFill>
+                  <a:schemeClr val="accent1"/>
+                </a:solidFill>
+              </a14:hiddenFill>
+            </a:ext>
+            <a:ext uri="{91240B29-F687-4F45-9708-019B960494DF}">
+              <a14:hiddenLine xmlns:a14="http://schemas.microsoft.com/office/drawing/2010/main" w="9525">
+                <a:solidFill>
+                  <a:schemeClr val="tx1"/>
+                </a:solidFill>
+                <a:miter lim="800000"/>
+                <a:headEnd/>
+                <a:tailEnd/>
+              </a14:hiddenLine>
+            </a:ext>
+          </a:extLst>
+        </p:spPr>
+      </p:pic>
+      <p:sp>
+        <p:nvSpPr>
+          <p:cNvPr id="8" name="Oval 7"/>
+          <p:cNvSpPr/>
+          <p:nvPr/>
+        </p:nvSpPr>
+        <p:spPr>
+          <a:xfrm rot="5400000">
+            <a:off x="6727640" y="663760"/>
+            <a:ext cx="1049044" cy="1093125"/>
+          </a:xfrm>
+          <a:prstGeom prst="ellipse">
+            <a:avLst/>
+          </a:prstGeom>
+          <a:noFill/>
+          <a:ln w="47625">
+            <a:solidFill>
+              <a:srgbClr val="0000FF"/>
+            </a:solidFill>
+            <a:prstDash val="dash"/>
+          </a:ln>
+        </p:spPr>
+        <p:style>
+          <a:lnRef idx="2">
+            <a:schemeClr val="accent1">
+              <a:shade val="50000"/>
+            </a:schemeClr>
+          </a:lnRef>
+          <a:fillRef idx="1">
+            <a:schemeClr val="accent1"/>
+          </a:fillRef>
+          <a:effectRef idx="0">
+            <a:schemeClr val="accent1"/>
+          </a:effectRef>
+          <a:fontRef idx="minor">
+            <a:schemeClr val="lt1"/>
+          </a:fontRef>
+        </p:style>
+        <p:txBody>
+          <a:bodyPr rtlCol="0" anchor="ctr"/>
+          <a:lstStyle/>
+          <a:p>
+            <a:pPr algn="ctr"/>
+            <a:endParaRPr lang="en-US"/>
+          </a:p>
+        </p:txBody>
+      </p:sp>
+    </p:spTree>
+    <p:extLst>
+      <p:ext uri="{BB962C8B-B14F-4D97-AF65-F5344CB8AC3E}">
+        <p14:creationId xmlns:p14="http://schemas.microsoft.com/office/powerpoint/2010/main" val="2035916575"/>
+      </p:ext>
+    </p:extLst>
+  </p:cSld>
+  <p:clrMapOvr>
+    <a:masterClrMapping/>
+  </p:clrMapOvr>
+</p:sld>
+</file>
+
+<file path=ppt/slides/slide26.xml><?xml version="1.0" encoding="utf-8"?>
+<p:sld xmlns:a="http://schemas.openxmlformats.org/drawingml/2006/main" xmlns:r="http://schemas.openxmlformats.org/officeDocument/2006/relationships" xmlns:p="http://schemas.openxmlformats.org/presentationml/2006/main">
+  <p:cSld>
+    <p:spTree>
+      <p:nvGrpSpPr>
+        <p:cNvPr id="1" name=""/>
+        <p:cNvGrpSpPr/>
+        <p:nvPr/>
+      </p:nvGrpSpPr>
+      <p:grpSpPr>
+        <a:xfrm>
+          <a:off x="0" y="0"/>
+          <a:ext cx="0" cy="0"/>
+          <a:chOff x="0" y="0"/>
+          <a:chExt cx="0" cy="0"/>
+        </a:xfrm>
+      </p:grpSpPr>
+      <p:pic>
+        <p:nvPicPr>
+          <p:cNvPr id="21506" name="Picture 2"/>
+          <p:cNvPicPr>
+            <a:picLocks noChangeAspect="1" noChangeArrowheads="1"/>
+          </p:cNvPicPr>
+          <p:nvPr/>
+        </p:nvPicPr>
+        <p:blipFill>
+          <a:blip r:embed="rId2">
+            <a:extLst>
+              <a:ext uri="{28A0092B-C50C-407E-A947-70E740481C1C}">
+                <a14:useLocalDpi xmlns:a14="http://schemas.microsoft.com/office/drawing/2010/main" val="0"/>
+              </a:ext>
+            </a:extLst>
+          </a:blip>
+          <a:srcRect/>
+          <a:stretch>
+            <a:fillRect/>
+          </a:stretch>
+        </p:blipFill>
+        <p:spPr bwMode="auto">
+          <a:xfrm>
+            <a:off x="1676400" y="2667000"/>
+            <a:ext cx="5483986" cy="3633788"/>
+          </a:xfrm>
+          <a:prstGeom prst="rect">
+            <a:avLst/>
+          </a:prstGeom>
+          <a:noFill/>
+          <a:ln>
+            <a:noFill/>
+          </a:ln>
+          <a:extLst>
+            <a:ext uri="{909E8E84-426E-40DD-AFC4-6F175D3DCCD1}">
+              <a14:hiddenFill xmlns:a14="http://schemas.microsoft.com/office/drawing/2010/main">
+                <a:solidFill>
+                  <a:schemeClr val="accent1"/>
+                </a:solidFill>
+              </a14:hiddenFill>
+            </a:ext>
+            <a:ext uri="{91240B29-F687-4F45-9708-019B960494DF}">
+              <a14:hiddenLine xmlns:a14="http://schemas.microsoft.com/office/drawing/2010/main" w="9525">
+                <a:solidFill>
+                  <a:schemeClr val="tx1"/>
+                </a:solidFill>
+                <a:miter lim="800000"/>
+                <a:headEnd/>
+                <a:tailEnd/>
+              </a14:hiddenLine>
+            </a:ext>
+          </a:extLst>
+        </p:spPr>
+      </p:pic>
+      <p:sp>
+        <p:nvSpPr>
+          <p:cNvPr id="3" name="TextBox 2"/>
+          <p:cNvSpPr txBox="1"/>
+          <p:nvPr/>
+        </p:nvSpPr>
+        <p:spPr>
+          <a:xfrm>
+            <a:off x="0" y="0"/>
+            <a:ext cx="3541354" cy="369332"/>
+          </a:xfrm>
+          <a:prstGeom prst="rect">
+            <a:avLst/>
+          </a:prstGeom>
+          <a:noFill/>
+        </p:spPr>
+        <p:txBody>
+          <a:bodyPr wrap="none" rtlCol="0">
+            <a:spAutoFit/>
+          </a:bodyPr>
+          <a:lstStyle/>
+          <a:p>
+            <a:r>
+              <a:rPr lang="ja-JP" altLang="en-US" dirty="0" smtClean="0"/>
+              <a:t>バグ８．エッジ間の距離が近すぎる</a:t>
+            </a:r>
+            <a:endParaRPr lang="en-US" dirty="0"/>
+          </a:p>
+        </p:txBody>
+      </p:sp>
+    </p:spTree>
+    <p:extLst>
+      <p:ext uri="{BB962C8B-B14F-4D97-AF65-F5344CB8AC3E}">
+        <p14:creationId xmlns:p14="http://schemas.microsoft.com/office/powerpoint/2010/main" val="4285487172"/>
+      </p:ext>
+    </p:extLst>
+  </p:cSld>
+  <p:clrMapOvr>
+    <a:masterClrMapping/>
+  </p:clrMapOvr>
+</p:sld>
+</file>
+
+<file path=ppt/slides/slide27.xml><?xml version="1.0" encoding="utf-8"?>
+<p:sld xmlns:a="http://schemas.openxmlformats.org/drawingml/2006/main" xmlns:r="http://schemas.openxmlformats.org/officeDocument/2006/relationships" xmlns:p="http://schemas.openxmlformats.org/presentationml/2006/main">
+  <p:cSld>
+    <p:spTree>
+      <p:nvGrpSpPr>
+        <p:cNvPr id="1" name=""/>
+        <p:cNvGrpSpPr/>
+        <p:nvPr/>
+      </p:nvGrpSpPr>
+      <p:grpSpPr>
+        <a:xfrm>
+          <a:off x="0" y="0"/>
+          <a:ext cx="0" cy="0"/>
+          <a:chOff x="0" y="0"/>
+          <a:chExt cx="0" cy="0"/>
+        </a:xfrm>
+      </p:grpSpPr>
+      <p:pic>
+        <p:nvPicPr>
+          <p:cNvPr id="22530" name="Picture 2"/>
+          <p:cNvPicPr>
+            <a:picLocks noChangeAspect="1" noChangeArrowheads="1"/>
+          </p:cNvPicPr>
+          <p:nvPr/>
+        </p:nvPicPr>
+        <p:blipFill>
+          <a:blip r:embed="rId2">
+            <a:extLst>
+              <a:ext uri="{28A0092B-C50C-407E-A947-70E740481C1C}">
+                <a14:useLocalDpi xmlns:a14="http://schemas.microsoft.com/office/drawing/2010/main" val="0"/>
+              </a:ext>
+            </a:extLst>
+          </a:blip>
+          <a:srcRect/>
+          <a:stretch>
+            <a:fillRect/>
+          </a:stretch>
+        </p:blipFill>
+        <p:spPr bwMode="auto">
+          <a:xfrm>
             <a:off x="1981200" y="3027066"/>
             <a:ext cx="5722679" cy="3111900"/>
           </a:xfrm>
@@ -5990,7 +6738,7 @@
 </p:sld>
 </file>
 
-<file path=ppt/slides/slide23.xml><?xml version="1.0" encoding="utf-8"?>
+<file path=ppt/slides/slide28.xml><?xml version="1.0" encoding="utf-8"?>
 <p:sld xmlns:a="http://schemas.openxmlformats.org/drawingml/2006/main" xmlns:r="http://schemas.openxmlformats.org/officeDocument/2006/relationships" xmlns:p="http://schemas.openxmlformats.org/presentationml/2006/main">
   <p:cSld>
     <p:spTree>
@@ -6185,7 +6933,7 @@
           <p:nvPr/>
         </p:nvPicPr>
         <p:blipFill>
-          <a:blip r:embed="rId2" cstate="print">
+          <a:blip r:embed="rId2">
             <a:extLst>
               <a:ext uri="{28A0092B-C50C-407E-A947-70E740481C1C}">
                 <a14:useLocalDpi xmlns:a14="http://schemas.microsoft.com/office/drawing/2010/main" val="0"/>
@@ -6199,8 +6947,8 @@
         </p:blipFill>
         <p:spPr bwMode="auto">
           <a:xfrm>
-            <a:off x="381000" y="3200400"/>
-            <a:ext cx="3810000" cy="3281123"/>
+            <a:off x="1752600" y="1905000"/>
+            <a:ext cx="5091112" cy="3519702"/>
           </a:xfrm>
           <a:prstGeom prst="rect">
             <a:avLst/>
@@ -6239,7 +6987,7 @@
         <p:spPr>
           <a:xfrm>
             <a:off x="0" y="0"/>
-            <a:ext cx="8536568" cy="369332"/>
+            <a:ext cx="3021981" cy="369332"/>
           </a:xfrm>
           <a:prstGeom prst="rect">
             <a:avLst/>
@@ -6254,324 +7002,28 @@
           <a:p>
             <a:r>
               <a:rPr lang="ja-JP" altLang="en-US" dirty="0" smtClean="0"/>
-              <a:t>バグ２．鋭角で接続された道路がある。</a:t>
-            </a:r>
-            <a:r>
-              <a:rPr lang="en-US" altLang="ja-JP" dirty="0" err="1" smtClean="0"/>
-              <a:t>hasRedundant</a:t>
-            </a:r>
-            <a:r>
-              <a:rPr lang="en-US" altLang="ja-JP" dirty="0" smtClean="0"/>
-              <a:t>()</a:t>
+              <a:t>バ</a:t>
             </a:r>
             <a:r>
               <a:rPr lang="ja-JP" altLang="en-US" dirty="0" smtClean="0"/>
-              <a:t>関数で除外されるはずなのに？</a:t>
+              <a:t>グ</a:t>
+            </a:r>
+            <a:r>
+              <a:rPr lang="ja-JP" altLang="en-US" dirty="0"/>
+              <a:t>２</a:t>
+            </a:r>
+            <a:r>
+              <a:rPr lang="ja-JP" altLang="en-US" dirty="0" smtClean="0"/>
+              <a:t>．エッジが交差している</a:t>
             </a:r>
             <a:endParaRPr lang="en-US" dirty="0"/>
-          </a:p>
-        </p:txBody>
-      </p:sp>
-      <p:sp>
-        <p:nvSpPr>
-          <p:cNvPr id="2" name="Oval 1"/>
-          <p:cNvSpPr/>
-          <p:nvPr/>
-        </p:nvSpPr>
-        <p:spPr>
-          <a:xfrm>
-            <a:off x="2057400" y="4495800"/>
-            <a:ext cx="990600" cy="990600"/>
-          </a:xfrm>
-          <a:prstGeom prst="ellipse">
-            <a:avLst/>
-          </a:prstGeom>
-          <a:noFill/>
-          <a:ln w="47625">
-            <a:solidFill>
-              <a:srgbClr val="FF0000"/>
-            </a:solidFill>
-            <a:prstDash val="dash"/>
-          </a:ln>
-        </p:spPr>
-        <p:style>
-          <a:lnRef idx="2">
-            <a:schemeClr val="accent1">
-              <a:shade val="50000"/>
-            </a:schemeClr>
-          </a:lnRef>
-          <a:fillRef idx="1">
-            <a:schemeClr val="accent1"/>
-          </a:fillRef>
-          <a:effectRef idx="0">
-            <a:schemeClr val="accent1"/>
-          </a:effectRef>
-          <a:fontRef idx="minor">
-            <a:schemeClr val="lt1"/>
-          </a:fontRef>
-        </p:style>
-        <p:txBody>
-          <a:bodyPr rtlCol="0" anchor="ctr"/>
-          <a:lstStyle/>
-          <a:p>
-            <a:pPr algn="ctr"/>
-            <a:endParaRPr lang="en-US"/>
-          </a:p>
-        </p:txBody>
-      </p:sp>
-      <p:pic>
-        <p:nvPicPr>
-          <p:cNvPr id="3076" name="Picture 4"/>
-          <p:cNvPicPr>
-            <a:picLocks noChangeAspect="1" noChangeArrowheads="1"/>
-          </p:cNvPicPr>
-          <p:nvPr/>
-        </p:nvPicPr>
-        <p:blipFill>
-          <a:blip r:embed="rId3">
-            <a:extLst>
-              <a:ext uri="{28A0092B-C50C-407E-A947-70E740481C1C}">
-                <a14:useLocalDpi xmlns:a14="http://schemas.microsoft.com/office/drawing/2010/main" val="0"/>
-              </a:ext>
-            </a:extLst>
-          </a:blip>
-          <a:srcRect/>
-          <a:stretch>
-            <a:fillRect/>
-          </a:stretch>
-        </p:blipFill>
-        <p:spPr bwMode="auto">
-          <a:xfrm>
-            <a:off x="4681536" y="3207099"/>
-            <a:ext cx="4462463" cy="3156925"/>
-          </a:xfrm>
-          <a:prstGeom prst="rect">
-            <a:avLst/>
-          </a:prstGeom>
-          <a:noFill/>
-          <a:ln>
-            <a:noFill/>
-          </a:ln>
-          <a:extLst>
-            <a:ext uri="{909E8E84-426E-40DD-AFC4-6F175D3DCCD1}">
-              <a14:hiddenFill xmlns:a14="http://schemas.microsoft.com/office/drawing/2010/main">
-                <a:solidFill>
-                  <a:schemeClr val="accent1"/>
-                </a:solidFill>
-              </a14:hiddenFill>
-            </a:ext>
-            <a:ext uri="{91240B29-F687-4F45-9708-019B960494DF}">
-              <a14:hiddenLine xmlns:a14="http://schemas.microsoft.com/office/drawing/2010/main" w="9525">
-                <a:solidFill>
-                  <a:schemeClr val="tx1"/>
-                </a:solidFill>
-                <a:miter lim="800000"/>
-                <a:headEnd/>
-                <a:tailEnd/>
-              </a14:hiddenLine>
-            </a:ext>
-          </a:extLst>
-        </p:spPr>
-      </p:pic>
-      <p:sp>
-        <p:nvSpPr>
-          <p:cNvPr id="7" name="Oval 6"/>
-          <p:cNvSpPr/>
-          <p:nvPr/>
-        </p:nvSpPr>
-        <p:spPr>
-          <a:xfrm>
-            <a:off x="6705600" y="3854548"/>
-            <a:ext cx="990600" cy="990600"/>
-          </a:xfrm>
-          <a:prstGeom prst="ellipse">
-            <a:avLst/>
-          </a:prstGeom>
-          <a:noFill/>
-          <a:ln w="47625">
-            <a:solidFill>
-              <a:srgbClr val="FF0000"/>
-            </a:solidFill>
-            <a:prstDash val="dash"/>
-          </a:ln>
-        </p:spPr>
-        <p:style>
-          <a:lnRef idx="2">
-            <a:schemeClr val="accent1">
-              <a:shade val="50000"/>
-            </a:schemeClr>
-          </a:lnRef>
-          <a:fillRef idx="1">
-            <a:schemeClr val="accent1"/>
-          </a:fillRef>
-          <a:effectRef idx="0">
-            <a:schemeClr val="accent1"/>
-          </a:effectRef>
-          <a:fontRef idx="minor">
-            <a:schemeClr val="lt1"/>
-          </a:fontRef>
-        </p:style>
-        <p:txBody>
-          <a:bodyPr rtlCol="0" anchor="ctr"/>
-          <a:lstStyle/>
-          <a:p>
-            <a:pPr algn="ctr"/>
-            <a:endParaRPr lang="en-US"/>
-          </a:p>
-        </p:txBody>
-      </p:sp>
-      <p:sp>
-        <p:nvSpPr>
-          <p:cNvPr id="8" name="Oval 7"/>
-          <p:cNvSpPr/>
-          <p:nvPr/>
-        </p:nvSpPr>
-        <p:spPr>
-          <a:xfrm>
-            <a:off x="6386146" y="5390590"/>
-            <a:ext cx="990600" cy="990600"/>
-          </a:xfrm>
-          <a:prstGeom prst="ellipse">
-            <a:avLst/>
-          </a:prstGeom>
-          <a:noFill/>
-          <a:ln w="47625">
-            <a:solidFill>
-              <a:srgbClr val="FF0000"/>
-            </a:solidFill>
-            <a:prstDash val="dash"/>
-          </a:ln>
-        </p:spPr>
-        <p:style>
-          <a:lnRef idx="2">
-            <a:schemeClr val="accent1">
-              <a:shade val="50000"/>
-            </a:schemeClr>
-          </a:lnRef>
-          <a:fillRef idx="1">
-            <a:schemeClr val="accent1"/>
-          </a:fillRef>
-          <a:effectRef idx="0">
-            <a:schemeClr val="accent1"/>
-          </a:effectRef>
-          <a:fontRef idx="minor">
-            <a:schemeClr val="lt1"/>
-          </a:fontRef>
-        </p:style>
-        <p:txBody>
-          <a:bodyPr rtlCol="0" anchor="ctr"/>
-          <a:lstStyle/>
-          <a:p>
-            <a:pPr algn="ctr"/>
-            <a:endParaRPr lang="en-US"/>
-          </a:p>
-        </p:txBody>
-      </p:sp>
-      <p:pic>
-        <p:nvPicPr>
-          <p:cNvPr id="3077" name="Picture 5"/>
-          <p:cNvPicPr>
-            <a:picLocks noChangeAspect="1" noChangeArrowheads="1"/>
-          </p:cNvPicPr>
-          <p:nvPr/>
-        </p:nvPicPr>
-        <p:blipFill>
-          <a:blip r:embed="rId4">
-            <a:extLst>
-              <a:ext uri="{28A0092B-C50C-407E-A947-70E740481C1C}">
-                <a14:useLocalDpi xmlns:a14="http://schemas.microsoft.com/office/drawing/2010/main" val="0"/>
-              </a:ext>
-            </a:extLst>
-          </a:blip>
-          <a:srcRect/>
-          <a:stretch>
-            <a:fillRect/>
-          </a:stretch>
-        </p:blipFill>
-        <p:spPr bwMode="auto">
-          <a:xfrm>
-            <a:off x="370953" y="533400"/>
-            <a:ext cx="3475502" cy="2362200"/>
-          </a:xfrm>
-          <a:prstGeom prst="rect">
-            <a:avLst/>
-          </a:prstGeom>
-          <a:noFill/>
-          <a:ln>
-            <a:noFill/>
-          </a:ln>
-          <a:extLst>
-            <a:ext uri="{909E8E84-426E-40DD-AFC4-6F175D3DCCD1}">
-              <a14:hiddenFill xmlns:a14="http://schemas.microsoft.com/office/drawing/2010/main">
-                <a:solidFill>
-                  <a:schemeClr val="accent1"/>
-                </a:solidFill>
-              </a14:hiddenFill>
-            </a:ext>
-            <a:ext uri="{91240B29-F687-4F45-9708-019B960494DF}">
-              <a14:hiddenLine xmlns:a14="http://schemas.microsoft.com/office/drawing/2010/main" w="9525">
-                <a:solidFill>
-                  <a:schemeClr val="tx1"/>
-                </a:solidFill>
-                <a:miter lim="800000"/>
-                <a:headEnd/>
-                <a:tailEnd/>
-              </a14:hiddenLine>
-            </a:ext>
-          </a:extLst>
-        </p:spPr>
-      </p:pic>
-      <p:sp>
-        <p:nvSpPr>
-          <p:cNvPr id="10" name="Oval 9"/>
-          <p:cNvSpPr/>
-          <p:nvPr/>
-        </p:nvSpPr>
-        <p:spPr>
-          <a:xfrm>
-            <a:off x="2286000" y="1371600"/>
-            <a:ext cx="990600" cy="990600"/>
-          </a:xfrm>
-          <a:prstGeom prst="ellipse">
-            <a:avLst/>
-          </a:prstGeom>
-          <a:noFill/>
-          <a:ln w="47625">
-            <a:solidFill>
-              <a:srgbClr val="FF0000"/>
-            </a:solidFill>
-            <a:prstDash val="dash"/>
-          </a:ln>
-        </p:spPr>
-        <p:style>
-          <a:lnRef idx="2">
-            <a:schemeClr val="accent1">
-              <a:shade val="50000"/>
-            </a:schemeClr>
-          </a:lnRef>
-          <a:fillRef idx="1">
-            <a:schemeClr val="accent1"/>
-          </a:fillRef>
-          <a:effectRef idx="0">
-            <a:schemeClr val="accent1"/>
-          </a:effectRef>
-          <a:fontRef idx="minor">
-            <a:schemeClr val="lt1"/>
-          </a:fontRef>
-        </p:style>
-        <p:txBody>
-          <a:bodyPr rtlCol="0" anchor="ctr"/>
-          <a:lstStyle/>
-          <a:p>
-            <a:pPr algn="ctr"/>
-            <a:endParaRPr lang="en-US"/>
           </a:p>
         </p:txBody>
       </p:sp>
     </p:spTree>
     <p:extLst>
       <p:ext uri="{BB962C8B-B14F-4D97-AF65-F5344CB8AC3E}">
-        <p14:creationId xmlns:p14="http://schemas.microsoft.com/office/powerpoint/2010/main" val="1116473750"/>
+        <p14:creationId xmlns:p14="http://schemas.microsoft.com/office/powerpoint/2010/main" val="4106979996"/>
       </p:ext>
     </p:extLst>
   </p:cSld>
@@ -6621,8 +7073,8 @@
         </p:blipFill>
         <p:spPr bwMode="auto">
           <a:xfrm>
-            <a:off x="704911" y="3738685"/>
-            <a:ext cx="2976545" cy="2709740"/>
+            <a:off x="1981200" y="1905000"/>
+            <a:ext cx="5129213" cy="4118599"/>
           </a:xfrm>
           <a:prstGeom prst="rect">
             <a:avLst/>
@@ -6661,7 +7113,7 @@
         <p:spPr>
           <a:xfrm>
             <a:off x="0" y="0"/>
-            <a:ext cx="7362913" cy="369332"/>
+            <a:ext cx="4152483" cy="369332"/>
           </a:xfrm>
           <a:prstGeom prst="rect">
             <a:avLst/>
@@ -6676,124 +7128,36 @@
           <a:p>
             <a:r>
               <a:rPr lang="ja-JP" altLang="en-US" dirty="0" smtClean="0"/>
-              <a:t>バグ３．頂点のすぐ近くに、他のエッジがある。なぜスナップしていないか？</a:t>
+              <a:t>バ</a:t>
+            </a:r>
+            <a:r>
+              <a:rPr lang="ja-JP" altLang="en-US" dirty="0" smtClean="0"/>
+              <a:t>グ３．</a:t>
+            </a:r>
+            <a:r>
+              <a:rPr lang="en-US" altLang="ja-JP" dirty="0" smtClean="0"/>
+              <a:t>example</a:t>
+            </a:r>
+            <a:r>
+              <a:rPr lang="ja-JP" altLang="en-US" dirty="0" smtClean="0"/>
+              <a:t>エッジが</a:t>
+            </a:r>
+            <a:r>
+              <a:rPr lang="en-US" altLang="ja-JP" dirty="0" smtClean="0"/>
+              <a:t>dangling</a:t>
+            </a:r>
+            <a:r>
+              <a:rPr lang="ja-JP" altLang="en-US" dirty="0" smtClean="0"/>
+              <a:t>している</a:t>
             </a:r>
             <a:endParaRPr lang="en-US" dirty="0"/>
           </a:p>
         </p:txBody>
       </p:sp>
-      <p:pic>
-        <p:nvPicPr>
-          <p:cNvPr id="4099" name="Picture 3"/>
-          <p:cNvPicPr>
-            <a:picLocks noChangeAspect="1" noChangeArrowheads="1"/>
-          </p:cNvPicPr>
-          <p:nvPr/>
-        </p:nvPicPr>
-        <p:blipFill>
-          <a:blip r:embed="rId3">
-            <a:extLst>
-              <a:ext uri="{28A0092B-C50C-407E-A947-70E740481C1C}">
-                <a14:useLocalDpi xmlns:a14="http://schemas.microsoft.com/office/drawing/2010/main" val="0"/>
-              </a:ext>
-            </a:extLst>
-          </a:blip>
-          <a:srcRect/>
-          <a:stretch>
-            <a:fillRect/>
-          </a:stretch>
-        </p:blipFill>
-        <p:spPr bwMode="auto">
-          <a:xfrm>
-            <a:off x="5495003" y="3962400"/>
-            <a:ext cx="2706022" cy="2478489"/>
-          </a:xfrm>
-          <a:prstGeom prst="rect">
-            <a:avLst/>
-          </a:prstGeom>
-          <a:noFill/>
-          <a:ln>
-            <a:noFill/>
-          </a:ln>
-          <a:extLst>
-            <a:ext uri="{909E8E84-426E-40DD-AFC4-6F175D3DCCD1}">
-              <a14:hiddenFill xmlns:a14="http://schemas.microsoft.com/office/drawing/2010/main">
-                <a:solidFill>
-                  <a:schemeClr val="accent1"/>
-                </a:solidFill>
-              </a14:hiddenFill>
-            </a:ext>
-            <a:ext uri="{91240B29-F687-4F45-9708-019B960494DF}">
-              <a14:hiddenLine xmlns:a14="http://schemas.microsoft.com/office/drawing/2010/main" w="9525">
-                <a:solidFill>
-                  <a:schemeClr val="tx1"/>
-                </a:solidFill>
-                <a:miter lim="800000"/>
-                <a:headEnd/>
-                <a:tailEnd/>
-              </a14:hiddenLine>
-            </a:ext>
-          </a:extLst>
-        </p:spPr>
-      </p:pic>
-      <p:pic>
-        <p:nvPicPr>
-          <p:cNvPr id="4100" name="Picture 4"/>
-          <p:cNvPicPr>
-            <a:picLocks noChangeAspect="1" noChangeArrowheads="1"/>
-          </p:cNvPicPr>
-          <p:nvPr/>
-        </p:nvPicPr>
-        <p:blipFill>
-          <a:blip r:embed="rId4">
-            <a:extLst>
-              <a:ext uri="{28A0092B-C50C-407E-A947-70E740481C1C}">
-                <a14:useLocalDpi xmlns:a14="http://schemas.microsoft.com/office/drawing/2010/main" val="0"/>
-              </a:ext>
-            </a:extLst>
-          </a:blip>
-          <a:srcRect/>
-          <a:stretch>
-            <a:fillRect/>
-          </a:stretch>
-        </p:blipFill>
-        <p:spPr bwMode="auto">
-          <a:xfrm>
-            <a:off x="704911" y="762000"/>
-            <a:ext cx="3586101" cy="2833687"/>
-          </a:xfrm>
-          <a:prstGeom prst="rect">
-            <a:avLst/>
-          </a:prstGeom>
-          <a:noFill/>
-          <a:ln>
-            <a:noFill/>
-          </a:ln>
-          <a:extLst>
-            <a:ext uri="{909E8E84-426E-40DD-AFC4-6F175D3DCCD1}">
-              <a14:hiddenFill xmlns:a14="http://schemas.microsoft.com/office/drawing/2010/main">
-                <a:solidFill>
-                  <a:schemeClr val="accent1"/>
-                </a:solidFill>
-              </a14:hiddenFill>
-            </a:ext>
-            <a:ext uri="{91240B29-F687-4F45-9708-019B960494DF}">
-              <a14:hiddenLine xmlns:a14="http://schemas.microsoft.com/office/drawing/2010/main" w="9525">
-                <a:solidFill>
-                  <a:schemeClr val="tx1"/>
-                </a:solidFill>
-                <a:miter lim="800000"/>
-                <a:headEnd/>
-                <a:tailEnd/>
-              </a14:hiddenLine>
-            </a:ext>
-          </a:extLst>
-        </p:spPr>
-      </p:pic>
     </p:spTree>
     <p:extLst>
       <p:ext uri="{BB962C8B-B14F-4D97-AF65-F5344CB8AC3E}">
-        <p14:creationId xmlns:p14="http://schemas.microsoft.com/office/powerpoint/2010/main" val="1581837469"/>
+        <p14:creationId xmlns:p14="http://schemas.microsoft.com/office/powerpoint/2010/main" val="2368290935"/>
       </p:ext>
     </p:extLst>
   </p:cSld>
@@ -6843,8 +7207,8 @@
         </p:blipFill>
         <p:spPr bwMode="auto">
           <a:xfrm>
-            <a:off x="1999622" y="1371600"/>
-            <a:ext cx="5029200" cy="5121966"/>
+            <a:off x="1814513" y="1676400"/>
+            <a:ext cx="5514975" cy="4105275"/>
           </a:xfrm>
           <a:prstGeom prst="rect">
             <a:avLst/>
@@ -6883,7 +7247,7 @@
         <p:spPr>
           <a:xfrm>
             <a:off x="0" y="0"/>
-            <a:ext cx="3996607" cy="369332"/>
+            <a:ext cx="3179460" cy="369332"/>
           </a:xfrm>
           <a:prstGeom prst="rect">
             <a:avLst/>
@@ -6898,110 +7262,28 @@
           <a:p>
             <a:r>
               <a:rPr lang="ja-JP" altLang="en-US" dirty="0" smtClean="0"/>
-              <a:t>バグ４．赤色になるべき道路が、白色？</a:t>
+              <a:t>バ</a:t>
+            </a:r>
+            <a:r>
+              <a:rPr lang="ja-JP" altLang="en-US" dirty="0" smtClean="0"/>
+              <a:t>グ４．短すぎる</a:t>
+            </a:r>
+            <a:r>
+              <a:rPr lang="en-US" altLang="ja-JP" dirty="0" smtClean="0"/>
+              <a:t>example</a:t>
+            </a:r>
+            <a:r>
+              <a:rPr lang="ja-JP" altLang="en-US" dirty="0" smtClean="0"/>
+              <a:t>エッジ</a:t>
             </a:r>
             <a:endParaRPr lang="en-US" dirty="0"/>
-          </a:p>
-        </p:txBody>
-      </p:sp>
-      <p:sp>
-        <p:nvSpPr>
-          <p:cNvPr id="4" name="Oval 3"/>
-          <p:cNvSpPr/>
-          <p:nvPr/>
-        </p:nvSpPr>
-        <p:spPr>
-          <a:xfrm rot="19230883">
-            <a:off x="2872915" y="4504949"/>
-            <a:ext cx="3657600" cy="762000"/>
-          </a:xfrm>
-          <a:prstGeom prst="ellipse">
-            <a:avLst/>
-          </a:prstGeom>
-          <a:noFill/>
-          <a:ln w="47625">
-            <a:solidFill>
-              <a:srgbClr val="FF0000"/>
-            </a:solidFill>
-            <a:prstDash val="dash"/>
-          </a:ln>
-        </p:spPr>
-        <p:style>
-          <a:lnRef idx="2">
-            <a:schemeClr val="accent1">
-              <a:shade val="50000"/>
-            </a:schemeClr>
-          </a:lnRef>
-          <a:fillRef idx="1">
-            <a:schemeClr val="accent1"/>
-          </a:fillRef>
-          <a:effectRef idx="0">
-            <a:schemeClr val="accent1"/>
-          </a:effectRef>
-          <a:fontRef idx="minor">
-            <a:schemeClr val="lt1"/>
-          </a:fontRef>
-        </p:style>
-        <p:txBody>
-          <a:bodyPr rtlCol="0" anchor="ctr"/>
-          <a:lstStyle/>
-          <a:p>
-            <a:pPr algn="ctr"/>
-            <a:endParaRPr lang="en-US"/>
-          </a:p>
-        </p:txBody>
-      </p:sp>
-      <p:sp>
-        <p:nvSpPr>
-          <p:cNvPr id="5" name="Oval 4"/>
-          <p:cNvSpPr/>
-          <p:nvPr/>
-        </p:nvSpPr>
-        <p:spPr>
-          <a:xfrm rot="319563">
-            <a:off x="2573213" y="2775546"/>
-            <a:ext cx="838200" cy="3037114"/>
-          </a:xfrm>
-          <a:prstGeom prst="ellipse">
-            <a:avLst/>
-          </a:prstGeom>
-          <a:noFill/>
-          <a:ln w="47625">
-            <a:solidFill>
-              <a:srgbClr val="FF0000"/>
-            </a:solidFill>
-            <a:prstDash val="dash"/>
-          </a:ln>
-        </p:spPr>
-        <p:style>
-          <a:lnRef idx="2">
-            <a:schemeClr val="accent1">
-              <a:shade val="50000"/>
-            </a:schemeClr>
-          </a:lnRef>
-          <a:fillRef idx="1">
-            <a:schemeClr val="accent1"/>
-          </a:fillRef>
-          <a:effectRef idx="0">
-            <a:schemeClr val="accent1"/>
-          </a:effectRef>
-          <a:fontRef idx="minor">
-            <a:schemeClr val="lt1"/>
-          </a:fontRef>
-        </p:style>
-        <p:txBody>
-          <a:bodyPr rtlCol="0" anchor="ctr"/>
-          <a:lstStyle/>
-          <a:p>
-            <a:pPr algn="ctr"/>
-            <a:endParaRPr lang="en-US"/>
           </a:p>
         </p:txBody>
       </p:sp>
     </p:spTree>
     <p:extLst>
       <p:ext uri="{BB962C8B-B14F-4D97-AF65-F5344CB8AC3E}">
-        <p14:creationId xmlns:p14="http://schemas.microsoft.com/office/powerpoint/2010/main" val="3530708907"/>
+        <p14:creationId xmlns:p14="http://schemas.microsoft.com/office/powerpoint/2010/main" val="3290147608"/>
       </p:ext>
     </p:extLst>
   </p:cSld>
@@ -7030,7 +7312,7 @@
       </p:grpSpPr>
       <p:pic>
         <p:nvPicPr>
-          <p:cNvPr id="6146" name="Picture 2"/>
+          <p:cNvPr id="1026" name="Picture 2"/>
           <p:cNvPicPr>
             <a:picLocks noChangeAspect="1" noChangeArrowheads="1"/>
           </p:cNvPicPr>
@@ -7051,8 +7333,8 @@
         </p:blipFill>
         <p:spPr bwMode="auto">
           <a:xfrm>
-            <a:off x="1143000" y="1060101"/>
-            <a:ext cx="6553200" cy="5566398"/>
+            <a:off x="477069" y="533400"/>
+            <a:ext cx="8057331" cy="5854286"/>
           </a:xfrm>
           <a:prstGeom prst="rect">
             <a:avLst/>
@@ -7084,14 +7366,14 @@
       </p:pic>
       <p:sp>
         <p:nvSpPr>
-          <p:cNvPr id="3" name="TextBox 2"/>
+          <p:cNvPr id="2" name="TextBox 1"/>
           <p:cNvSpPr txBox="1"/>
           <p:nvPr/>
         </p:nvSpPr>
         <p:spPr>
           <a:xfrm>
             <a:off x="0" y="0"/>
-            <a:ext cx="7584512" cy="369332"/>
+            <a:ext cx="4546694" cy="369332"/>
           </a:xfrm>
           <a:prstGeom prst="rect">
             <a:avLst/>
@@ -7105,24 +7387,8 @@
           <a:lstStyle/>
           <a:p>
             <a:r>
-              <a:rPr lang="ja-JP" altLang="en-US" dirty="0" smtClean="0"/>
-              <a:t>バグ５．</a:t>
-            </a:r>
-            <a:r>
-              <a:rPr lang="en-US" altLang="ja-JP" dirty="0" smtClean="0"/>
-              <a:t>PM</a:t>
-            </a:r>
-            <a:r>
-              <a:rPr lang="ja-JP" altLang="en-US" dirty="0" smtClean="0"/>
-              <a:t>生成の道路のど真ん中に、なぜか</a:t>
-            </a:r>
-            <a:r>
-              <a:rPr lang="en-US" altLang="ja-JP" dirty="0" smtClean="0"/>
-              <a:t>example</a:t>
-            </a:r>
-            <a:r>
-              <a:rPr lang="ja-JP" altLang="en-US" dirty="0" smtClean="0"/>
-              <a:t>ベースの道路がある？</a:t>
+              <a:rPr lang="en-US" dirty="0" smtClean="0"/>
+              <a:t>Multi examples (Tel-Aviv, Canberra, and Tokyo)</a:t>
             </a:r>
             <a:endParaRPr lang="en-US" dirty="0"/>
           </a:p>
@@ -7131,7 +7397,7 @@
     </p:spTree>
     <p:extLst>
       <p:ext uri="{BB962C8B-B14F-4D97-AF65-F5344CB8AC3E}">
-        <p14:creationId xmlns:p14="http://schemas.microsoft.com/office/powerpoint/2010/main" val="3919586332"/>
+        <p14:creationId xmlns:p14="http://schemas.microsoft.com/office/powerpoint/2010/main" val="1338740069"/>
       </p:ext>
     </p:extLst>
   </p:cSld>
@@ -7158,9 +7424,55 @@
           <a:chExt cx="0" cy="0"/>
         </a:xfrm>
       </p:grpSpPr>
+      <p:sp>
+        <p:nvSpPr>
+          <p:cNvPr id="2" name="TextBox 1"/>
+          <p:cNvSpPr txBox="1"/>
+          <p:nvPr/>
+        </p:nvSpPr>
+        <p:spPr>
+          <a:xfrm>
+            <a:off x="0" y="0"/>
+            <a:ext cx="7679988" cy="369332"/>
+          </a:xfrm>
+          <a:prstGeom prst="rect">
+            <a:avLst/>
+          </a:prstGeom>
+          <a:noFill/>
+        </p:spPr>
+        <p:txBody>
+          <a:bodyPr wrap="none" rtlCol="0">
+            <a:spAutoFit/>
+          </a:bodyPr>
+          <a:lstStyle/>
+          <a:p>
+            <a:r>
+              <a:rPr lang="ja-JP" altLang="en-US" dirty="0" smtClean="0"/>
+              <a:t>バグ１．</a:t>
+            </a:r>
+            <a:r>
+              <a:rPr lang="en-US" altLang="ja-JP" dirty="0" smtClean="0"/>
+              <a:t>Parcel</a:t>
+            </a:r>
+            <a:r>
+              <a:rPr lang="ja-JP" altLang="en-US" dirty="0" smtClean="0"/>
+              <a:t>が全く生成されないケースがある。</a:t>
+            </a:r>
+            <a:r>
+              <a:rPr lang="en-US" altLang="ja-JP" dirty="0" smtClean="0"/>
+              <a:t>Block</a:t>
+            </a:r>
+            <a:r>
+              <a:rPr lang="ja-JP" altLang="en-US" dirty="0" smtClean="0"/>
+              <a:t>は生成されているのに。</a:t>
+            </a:r>
+            <a:endParaRPr lang="en-US" dirty="0"/>
+          </a:p>
+        </p:txBody>
+      </p:sp>
       <p:pic>
         <p:nvPicPr>
-          <p:cNvPr id="7170" name="Picture 2"/>
+          <p:cNvPr id="2050" name="Picture 2"/>
           <p:cNvPicPr>
             <a:picLocks noChangeAspect="1" noChangeArrowheads="1"/>
           </p:cNvPicPr>
@@ -7181,8 +7493,8 @@
         </p:blipFill>
         <p:spPr bwMode="auto">
           <a:xfrm>
-            <a:off x="1447800" y="1905000"/>
-            <a:ext cx="3148012" cy="4189008"/>
+            <a:off x="825639" y="838200"/>
+            <a:ext cx="7552721" cy="5638800"/>
           </a:xfrm>
           <a:prstGeom prst="rect">
             <a:avLst/>
@@ -7212,87 +7524,10 @@
           </a:extLst>
         </p:spPr>
       </p:pic>
-      <p:sp>
-        <p:nvSpPr>
-          <p:cNvPr id="3" name="TextBox 2"/>
-          <p:cNvSpPr txBox="1"/>
-          <p:nvPr/>
-        </p:nvSpPr>
-        <p:spPr>
-          <a:xfrm>
-            <a:off x="0" y="0"/>
-            <a:ext cx="3252814" cy="369332"/>
-          </a:xfrm>
-          <a:prstGeom prst="rect">
-            <a:avLst/>
-          </a:prstGeom>
-          <a:noFill/>
-        </p:spPr>
-        <p:txBody>
-          <a:bodyPr wrap="none" rtlCol="0">
-            <a:spAutoFit/>
-          </a:bodyPr>
-          <a:lstStyle/>
-          <a:p>
-            <a:r>
-              <a:rPr lang="ja-JP" altLang="en-US" dirty="0" smtClean="0"/>
-              <a:t>バグ６．エッジが交差している？</a:t>
-            </a:r>
-            <a:endParaRPr lang="en-US" dirty="0"/>
-          </a:p>
-        </p:txBody>
-      </p:sp>
-      <p:sp>
-        <p:nvSpPr>
-          <p:cNvPr id="4" name="Oval 3"/>
-          <p:cNvSpPr/>
-          <p:nvPr/>
-        </p:nvSpPr>
-        <p:spPr>
-          <a:xfrm>
-            <a:off x="2526506" y="3733800"/>
-            <a:ext cx="990600" cy="990600"/>
-          </a:xfrm>
-          <a:prstGeom prst="ellipse">
-            <a:avLst/>
-          </a:prstGeom>
-          <a:noFill/>
-          <a:ln w="47625">
-            <a:solidFill>
-              <a:srgbClr val="FF0000"/>
-            </a:solidFill>
-            <a:prstDash val="dash"/>
-          </a:ln>
-        </p:spPr>
-        <p:style>
-          <a:lnRef idx="2">
-            <a:schemeClr val="accent1">
-              <a:shade val="50000"/>
-            </a:schemeClr>
-          </a:lnRef>
-          <a:fillRef idx="1">
-            <a:schemeClr val="accent1"/>
-          </a:fillRef>
-          <a:effectRef idx="0">
-            <a:schemeClr val="accent1"/>
-          </a:effectRef>
-          <a:fontRef idx="minor">
-            <a:schemeClr val="lt1"/>
-          </a:fontRef>
-        </p:style>
-        <p:txBody>
-          <a:bodyPr rtlCol="0" anchor="ctr"/>
-          <a:lstStyle/>
-          <a:p>
-            <a:pPr algn="ctr"/>
-            <a:endParaRPr lang="en-US"/>
-          </a:p>
-        </p:txBody>
-      </p:sp>
     </p:spTree>
     <p:extLst>
       <p:ext uri="{BB962C8B-B14F-4D97-AF65-F5344CB8AC3E}">
-        <p14:creationId xmlns:p14="http://schemas.microsoft.com/office/powerpoint/2010/main" val="1996986813"/>
+        <p14:creationId xmlns:p14="http://schemas.microsoft.com/office/powerpoint/2010/main" val="1232756433"/>
       </p:ext>
     </p:extLst>
   </p:cSld>
@@ -7321,14 +7556,14 @@
       </p:grpSpPr>
       <p:pic>
         <p:nvPicPr>
-          <p:cNvPr id="8194" name="Picture 2"/>
+          <p:cNvPr id="3074" name="Picture 2"/>
           <p:cNvPicPr>
             <a:picLocks noChangeAspect="1" noChangeArrowheads="1"/>
           </p:cNvPicPr>
           <p:nvPr/>
         </p:nvPicPr>
         <p:blipFill>
-          <a:blip r:embed="rId2">
+          <a:blip r:embed="rId2" cstate="print">
             <a:extLst>
               <a:ext uri="{28A0092B-C50C-407E-A947-70E740481C1C}">
                 <a14:useLocalDpi xmlns:a14="http://schemas.microsoft.com/office/drawing/2010/main" val="0"/>
@@ -7342,8 +7577,8 @@
         </p:blipFill>
         <p:spPr bwMode="auto">
           <a:xfrm>
-            <a:off x="1295400" y="609600"/>
-            <a:ext cx="6629400" cy="5968200"/>
+            <a:off x="381000" y="3200400"/>
+            <a:ext cx="3810000" cy="3281123"/>
           </a:xfrm>
           <a:prstGeom prst="rect">
             <a:avLst/>
@@ -7382,7 +7617,7 @@
         <p:spPr>
           <a:xfrm>
             <a:off x="0" y="0"/>
-            <a:ext cx="2578655" cy="369332"/>
+            <a:ext cx="8536568" cy="369332"/>
           </a:xfrm>
           <a:prstGeom prst="rect">
             <a:avLst/>
@@ -7396,17 +7631,325 @@
           <a:lstStyle/>
           <a:p>
             <a:r>
-              <a:rPr lang="en-US" dirty="0" smtClean="0"/>
-              <a:t>Adaptive Fitting (Tel-Aviv)</a:t>
+              <a:rPr lang="ja-JP" altLang="en-US" dirty="0" smtClean="0"/>
+              <a:t>バグ２．鋭角で接続された道路がある。</a:t>
+            </a:r>
+            <a:r>
+              <a:rPr lang="en-US" altLang="ja-JP" dirty="0" err="1" smtClean="0"/>
+              <a:t>hasRedundant</a:t>
+            </a:r>
+            <a:r>
+              <a:rPr lang="en-US" altLang="ja-JP" dirty="0" smtClean="0"/>
+              <a:t>()</a:t>
+            </a:r>
+            <a:r>
+              <a:rPr lang="ja-JP" altLang="en-US" dirty="0" smtClean="0"/>
+              <a:t>関数で除外されるはずなのに？</a:t>
             </a:r>
             <a:endParaRPr lang="en-US" dirty="0"/>
+          </a:p>
+        </p:txBody>
+      </p:sp>
+      <p:sp>
+        <p:nvSpPr>
+          <p:cNvPr id="2" name="Oval 1"/>
+          <p:cNvSpPr/>
+          <p:nvPr/>
+        </p:nvSpPr>
+        <p:spPr>
+          <a:xfrm>
+            <a:off x="2057400" y="4495800"/>
+            <a:ext cx="990600" cy="990600"/>
+          </a:xfrm>
+          <a:prstGeom prst="ellipse">
+            <a:avLst/>
+          </a:prstGeom>
+          <a:noFill/>
+          <a:ln w="47625">
+            <a:solidFill>
+              <a:srgbClr val="FF0000"/>
+            </a:solidFill>
+            <a:prstDash val="dash"/>
+          </a:ln>
+        </p:spPr>
+        <p:style>
+          <a:lnRef idx="2">
+            <a:schemeClr val="accent1">
+              <a:shade val="50000"/>
+            </a:schemeClr>
+          </a:lnRef>
+          <a:fillRef idx="1">
+            <a:schemeClr val="accent1"/>
+          </a:fillRef>
+          <a:effectRef idx="0">
+            <a:schemeClr val="accent1"/>
+          </a:effectRef>
+          <a:fontRef idx="minor">
+            <a:schemeClr val="lt1"/>
+          </a:fontRef>
+        </p:style>
+        <p:txBody>
+          <a:bodyPr rtlCol="0" anchor="ctr"/>
+          <a:lstStyle/>
+          <a:p>
+            <a:pPr algn="ctr"/>
+            <a:endParaRPr lang="en-US"/>
+          </a:p>
+        </p:txBody>
+      </p:sp>
+      <p:pic>
+        <p:nvPicPr>
+          <p:cNvPr id="3076" name="Picture 4"/>
+          <p:cNvPicPr>
+            <a:picLocks noChangeAspect="1" noChangeArrowheads="1"/>
+          </p:cNvPicPr>
+          <p:nvPr/>
+        </p:nvPicPr>
+        <p:blipFill>
+          <a:blip r:embed="rId3">
+            <a:extLst>
+              <a:ext uri="{28A0092B-C50C-407E-A947-70E740481C1C}">
+                <a14:useLocalDpi xmlns:a14="http://schemas.microsoft.com/office/drawing/2010/main" val="0"/>
+              </a:ext>
+            </a:extLst>
+          </a:blip>
+          <a:srcRect/>
+          <a:stretch>
+            <a:fillRect/>
+          </a:stretch>
+        </p:blipFill>
+        <p:spPr bwMode="auto">
+          <a:xfrm>
+            <a:off x="4681536" y="3207099"/>
+            <a:ext cx="4462463" cy="3156925"/>
+          </a:xfrm>
+          <a:prstGeom prst="rect">
+            <a:avLst/>
+          </a:prstGeom>
+          <a:noFill/>
+          <a:ln>
+            <a:noFill/>
+          </a:ln>
+          <a:extLst>
+            <a:ext uri="{909E8E84-426E-40DD-AFC4-6F175D3DCCD1}">
+              <a14:hiddenFill xmlns:a14="http://schemas.microsoft.com/office/drawing/2010/main">
+                <a:solidFill>
+                  <a:schemeClr val="accent1"/>
+                </a:solidFill>
+              </a14:hiddenFill>
+            </a:ext>
+            <a:ext uri="{91240B29-F687-4F45-9708-019B960494DF}">
+              <a14:hiddenLine xmlns:a14="http://schemas.microsoft.com/office/drawing/2010/main" w="9525">
+                <a:solidFill>
+                  <a:schemeClr val="tx1"/>
+                </a:solidFill>
+                <a:miter lim="800000"/>
+                <a:headEnd/>
+                <a:tailEnd/>
+              </a14:hiddenLine>
+            </a:ext>
+          </a:extLst>
+        </p:spPr>
+      </p:pic>
+      <p:sp>
+        <p:nvSpPr>
+          <p:cNvPr id="7" name="Oval 6"/>
+          <p:cNvSpPr/>
+          <p:nvPr/>
+        </p:nvSpPr>
+        <p:spPr>
+          <a:xfrm>
+            <a:off x="6705600" y="3854548"/>
+            <a:ext cx="990600" cy="990600"/>
+          </a:xfrm>
+          <a:prstGeom prst="ellipse">
+            <a:avLst/>
+          </a:prstGeom>
+          <a:noFill/>
+          <a:ln w="47625">
+            <a:solidFill>
+              <a:srgbClr val="FF0000"/>
+            </a:solidFill>
+            <a:prstDash val="dash"/>
+          </a:ln>
+        </p:spPr>
+        <p:style>
+          <a:lnRef idx="2">
+            <a:schemeClr val="accent1">
+              <a:shade val="50000"/>
+            </a:schemeClr>
+          </a:lnRef>
+          <a:fillRef idx="1">
+            <a:schemeClr val="accent1"/>
+          </a:fillRef>
+          <a:effectRef idx="0">
+            <a:schemeClr val="accent1"/>
+          </a:effectRef>
+          <a:fontRef idx="minor">
+            <a:schemeClr val="lt1"/>
+          </a:fontRef>
+        </p:style>
+        <p:txBody>
+          <a:bodyPr rtlCol="0" anchor="ctr"/>
+          <a:lstStyle/>
+          <a:p>
+            <a:pPr algn="ctr"/>
+            <a:endParaRPr lang="en-US"/>
+          </a:p>
+        </p:txBody>
+      </p:sp>
+      <p:sp>
+        <p:nvSpPr>
+          <p:cNvPr id="8" name="Oval 7"/>
+          <p:cNvSpPr/>
+          <p:nvPr/>
+        </p:nvSpPr>
+        <p:spPr>
+          <a:xfrm>
+            <a:off x="6386146" y="5390590"/>
+            <a:ext cx="990600" cy="990600"/>
+          </a:xfrm>
+          <a:prstGeom prst="ellipse">
+            <a:avLst/>
+          </a:prstGeom>
+          <a:noFill/>
+          <a:ln w="47625">
+            <a:solidFill>
+              <a:srgbClr val="FF0000"/>
+            </a:solidFill>
+            <a:prstDash val="dash"/>
+          </a:ln>
+        </p:spPr>
+        <p:style>
+          <a:lnRef idx="2">
+            <a:schemeClr val="accent1">
+              <a:shade val="50000"/>
+            </a:schemeClr>
+          </a:lnRef>
+          <a:fillRef idx="1">
+            <a:schemeClr val="accent1"/>
+          </a:fillRef>
+          <a:effectRef idx="0">
+            <a:schemeClr val="accent1"/>
+          </a:effectRef>
+          <a:fontRef idx="minor">
+            <a:schemeClr val="lt1"/>
+          </a:fontRef>
+        </p:style>
+        <p:txBody>
+          <a:bodyPr rtlCol="0" anchor="ctr"/>
+          <a:lstStyle/>
+          <a:p>
+            <a:pPr algn="ctr"/>
+            <a:endParaRPr lang="en-US"/>
+          </a:p>
+        </p:txBody>
+      </p:sp>
+      <p:pic>
+        <p:nvPicPr>
+          <p:cNvPr id="3077" name="Picture 5"/>
+          <p:cNvPicPr>
+            <a:picLocks noChangeAspect="1" noChangeArrowheads="1"/>
+          </p:cNvPicPr>
+          <p:nvPr/>
+        </p:nvPicPr>
+        <p:blipFill>
+          <a:blip r:embed="rId4">
+            <a:extLst>
+              <a:ext uri="{28A0092B-C50C-407E-A947-70E740481C1C}">
+                <a14:useLocalDpi xmlns:a14="http://schemas.microsoft.com/office/drawing/2010/main" val="0"/>
+              </a:ext>
+            </a:extLst>
+          </a:blip>
+          <a:srcRect/>
+          <a:stretch>
+            <a:fillRect/>
+          </a:stretch>
+        </p:blipFill>
+        <p:spPr bwMode="auto">
+          <a:xfrm>
+            <a:off x="370953" y="533400"/>
+            <a:ext cx="3475502" cy="2362200"/>
+          </a:xfrm>
+          <a:prstGeom prst="rect">
+            <a:avLst/>
+          </a:prstGeom>
+          <a:noFill/>
+          <a:ln>
+            <a:noFill/>
+          </a:ln>
+          <a:extLst>
+            <a:ext uri="{909E8E84-426E-40DD-AFC4-6F175D3DCCD1}">
+              <a14:hiddenFill xmlns:a14="http://schemas.microsoft.com/office/drawing/2010/main">
+                <a:solidFill>
+                  <a:schemeClr val="accent1"/>
+                </a:solidFill>
+              </a14:hiddenFill>
+            </a:ext>
+            <a:ext uri="{91240B29-F687-4F45-9708-019B960494DF}">
+              <a14:hiddenLine xmlns:a14="http://schemas.microsoft.com/office/drawing/2010/main" w="9525">
+                <a:solidFill>
+                  <a:schemeClr val="tx1"/>
+                </a:solidFill>
+                <a:miter lim="800000"/>
+                <a:headEnd/>
+                <a:tailEnd/>
+              </a14:hiddenLine>
+            </a:ext>
+          </a:extLst>
+        </p:spPr>
+      </p:pic>
+      <p:sp>
+        <p:nvSpPr>
+          <p:cNvPr id="10" name="Oval 9"/>
+          <p:cNvSpPr/>
+          <p:nvPr/>
+        </p:nvSpPr>
+        <p:spPr>
+          <a:xfrm>
+            <a:off x="2286000" y="1371600"/>
+            <a:ext cx="990600" cy="990600"/>
+          </a:xfrm>
+          <a:prstGeom prst="ellipse">
+            <a:avLst/>
+          </a:prstGeom>
+          <a:noFill/>
+          <a:ln w="47625">
+            <a:solidFill>
+              <a:srgbClr val="FF0000"/>
+            </a:solidFill>
+            <a:prstDash val="dash"/>
+          </a:ln>
+        </p:spPr>
+        <p:style>
+          <a:lnRef idx="2">
+            <a:schemeClr val="accent1">
+              <a:shade val="50000"/>
+            </a:schemeClr>
+          </a:lnRef>
+          <a:fillRef idx="1">
+            <a:schemeClr val="accent1"/>
+          </a:fillRef>
+          <a:effectRef idx="0">
+            <a:schemeClr val="accent1"/>
+          </a:effectRef>
+          <a:fontRef idx="minor">
+            <a:schemeClr val="lt1"/>
+          </a:fontRef>
+        </p:style>
+        <p:txBody>
+          <a:bodyPr rtlCol="0" anchor="ctr"/>
+          <a:lstStyle/>
+          <a:p>
+            <a:pPr algn="ctr"/>
+            <a:endParaRPr lang="en-US"/>
           </a:p>
         </p:txBody>
       </p:sp>
     </p:spTree>
     <p:extLst>
       <p:ext uri="{BB962C8B-B14F-4D97-AF65-F5344CB8AC3E}">
-        <p14:creationId xmlns:p14="http://schemas.microsoft.com/office/powerpoint/2010/main" val="949091332"/>
+        <p14:creationId xmlns:p14="http://schemas.microsoft.com/office/powerpoint/2010/main" val="1116473750"/>
       </p:ext>
     </p:extLst>
   </p:cSld>
@@ -7435,7 +7978,7 @@
       </p:grpSpPr>
       <p:pic>
         <p:nvPicPr>
-          <p:cNvPr id="9218" name="Picture 2"/>
+          <p:cNvPr id="4098" name="Picture 2"/>
           <p:cNvPicPr>
             <a:picLocks noChangeAspect="1" noChangeArrowheads="1"/>
           </p:cNvPicPr>
@@ -7456,8 +7999,8 @@
         </p:blipFill>
         <p:spPr bwMode="auto">
           <a:xfrm>
-            <a:off x="1347787" y="1447800"/>
-            <a:ext cx="6448425" cy="5000625"/>
+            <a:off x="704911" y="3738685"/>
+            <a:ext cx="2976545" cy="2709740"/>
           </a:xfrm>
           <a:prstGeom prst="rect">
             <a:avLst/>
@@ -7496,7 +8039,7 @@
         <p:spPr>
           <a:xfrm>
             <a:off x="0" y="0"/>
-            <a:ext cx="5499904" cy="369332"/>
+            <a:ext cx="7362913" cy="369332"/>
           </a:xfrm>
           <a:prstGeom prst="rect">
             <a:avLst/>
@@ -7511,32 +8054,124 @@
           <a:p>
             <a:r>
               <a:rPr lang="ja-JP" altLang="en-US" dirty="0" smtClean="0"/>
-              <a:t>バグ</a:t>
-            </a:r>
-            <a:r>
-              <a:rPr lang="ja-JP" altLang="en-US" dirty="0"/>
-              <a:t>１</a:t>
-            </a:r>
-            <a:r>
-              <a:rPr lang="ja-JP" altLang="en-US" dirty="0" smtClean="0"/>
-              <a:t>．円の中は、</a:t>
-            </a:r>
-            <a:r>
-              <a:rPr lang="en-US" altLang="ja-JP" dirty="0" smtClean="0"/>
-              <a:t>Parcel</a:t>
-            </a:r>
-            <a:r>
-              <a:rPr lang="ja-JP" altLang="en-US" dirty="0" smtClean="0"/>
-              <a:t>を生成しないようにしたい。。。</a:t>
+              <a:t>バグ３．頂点のすぐ近くに、他のエッジがある。なぜスナップしていないか？</a:t>
             </a:r>
             <a:endParaRPr lang="en-US" dirty="0"/>
           </a:p>
         </p:txBody>
       </p:sp>
+      <p:pic>
+        <p:nvPicPr>
+          <p:cNvPr id="4099" name="Picture 3"/>
+          <p:cNvPicPr>
+            <a:picLocks noChangeAspect="1" noChangeArrowheads="1"/>
+          </p:cNvPicPr>
+          <p:nvPr/>
+        </p:nvPicPr>
+        <p:blipFill>
+          <a:blip r:embed="rId3">
+            <a:extLst>
+              <a:ext uri="{28A0092B-C50C-407E-A947-70E740481C1C}">
+                <a14:useLocalDpi xmlns:a14="http://schemas.microsoft.com/office/drawing/2010/main" val="0"/>
+              </a:ext>
+            </a:extLst>
+          </a:blip>
+          <a:srcRect/>
+          <a:stretch>
+            <a:fillRect/>
+          </a:stretch>
+        </p:blipFill>
+        <p:spPr bwMode="auto">
+          <a:xfrm>
+            <a:off x="5495003" y="3962400"/>
+            <a:ext cx="2706022" cy="2478489"/>
+          </a:xfrm>
+          <a:prstGeom prst="rect">
+            <a:avLst/>
+          </a:prstGeom>
+          <a:noFill/>
+          <a:ln>
+            <a:noFill/>
+          </a:ln>
+          <a:extLst>
+            <a:ext uri="{909E8E84-426E-40DD-AFC4-6F175D3DCCD1}">
+              <a14:hiddenFill xmlns:a14="http://schemas.microsoft.com/office/drawing/2010/main">
+                <a:solidFill>
+                  <a:schemeClr val="accent1"/>
+                </a:solidFill>
+              </a14:hiddenFill>
+            </a:ext>
+            <a:ext uri="{91240B29-F687-4F45-9708-019B960494DF}">
+              <a14:hiddenLine xmlns:a14="http://schemas.microsoft.com/office/drawing/2010/main" w="9525">
+                <a:solidFill>
+                  <a:schemeClr val="tx1"/>
+                </a:solidFill>
+                <a:miter lim="800000"/>
+                <a:headEnd/>
+                <a:tailEnd/>
+              </a14:hiddenLine>
+            </a:ext>
+          </a:extLst>
+        </p:spPr>
+      </p:pic>
+      <p:pic>
+        <p:nvPicPr>
+          <p:cNvPr id="4100" name="Picture 4"/>
+          <p:cNvPicPr>
+            <a:picLocks noChangeAspect="1" noChangeArrowheads="1"/>
+          </p:cNvPicPr>
+          <p:nvPr/>
+        </p:nvPicPr>
+        <p:blipFill>
+          <a:blip r:embed="rId4">
+            <a:extLst>
+              <a:ext uri="{28A0092B-C50C-407E-A947-70E740481C1C}">
+                <a14:useLocalDpi xmlns:a14="http://schemas.microsoft.com/office/drawing/2010/main" val="0"/>
+              </a:ext>
+            </a:extLst>
+          </a:blip>
+          <a:srcRect/>
+          <a:stretch>
+            <a:fillRect/>
+          </a:stretch>
+        </p:blipFill>
+        <p:spPr bwMode="auto">
+          <a:xfrm>
+            <a:off x="704911" y="762000"/>
+            <a:ext cx="3586101" cy="2833687"/>
+          </a:xfrm>
+          <a:prstGeom prst="rect">
+            <a:avLst/>
+          </a:prstGeom>
+          <a:noFill/>
+          <a:ln>
+            <a:noFill/>
+          </a:ln>
+          <a:extLst>
+            <a:ext uri="{909E8E84-426E-40DD-AFC4-6F175D3DCCD1}">
+              <a14:hiddenFill xmlns:a14="http://schemas.microsoft.com/office/drawing/2010/main">
+                <a:solidFill>
+                  <a:schemeClr val="accent1"/>
+                </a:solidFill>
+              </a14:hiddenFill>
+            </a:ext>
+            <a:ext uri="{91240B29-F687-4F45-9708-019B960494DF}">
+              <a14:hiddenLine xmlns:a14="http://schemas.microsoft.com/office/drawing/2010/main" w="9525">
+                <a:solidFill>
+                  <a:schemeClr val="tx1"/>
+                </a:solidFill>
+                <a:miter lim="800000"/>
+                <a:headEnd/>
+                <a:tailEnd/>
+              </a14:hiddenLine>
+            </a:ext>
+          </a:extLst>
+        </p:spPr>
+      </p:pic>
     </p:spTree>
     <p:extLst>
       <p:ext uri="{BB962C8B-B14F-4D97-AF65-F5344CB8AC3E}">
-        <p14:creationId xmlns:p14="http://schemas.microsoft.com/office/powerpoint/2010/main" val="4159386612"/>
+        <p14:creationId xmlns:p14="http://schemas.microsoft.com/office/powerpoint/2010/main" val="1581837469"/>
       </p:ext>
     </p:extLst>
   </p:cSld>

</xml_diff>